<commit_message>
Más contenido para el ppt
</commit_message>
<xml_diff>
--- a/WCBIO25_Jorge-Monclus.pptx
+++ b/WCBIO25_Jorge-Monclus.pptx
@@ -31,8 +31,6 @@
     <p:sldId id="271" r:id="rId26"/>
     <p:sldId id="272" r:id="rId27"/>
     <p:sldId id="273" r:id="rId28"/>
-    <p:sldId id="274" r:id="rId29"/>
-    <p:sldId id="275" r:id="rId30"/>
   </p:sldIdLst>
   <p:sldSz cx="9144000" cy="5143500"/>
   <p:notesSz cx="7559675" cy="10691813"/>
@@ -153,7 +151,7 @@
         <p:txBody>
           <a:bodyPr/>
           <a:p>
-            <a:fld id="{47E3F491-B701-416A-9899-8E6198BA8BED}" type="slidenum">
+            <a:fld id="{2FB3D281-F317-4858-92F6-921C191E3128}" type="slidenum">
               <a:t>&lt;#&gt;</a:t>
             </a:fld>
           </a:p>
@@ -278,7 +276,7 @@
         <p:txBody>
           <a:bodyPr/>
           <a:p>
-            <a:fld id="{A4034DF9-2D3F-486E-997F-CF1450FB750D}" type="slidenum">
+            <a:fld id="{0265E80A-7AA0-4EDE-9029-9BF1BD1E509A}" type="slidenum">
               <a:t>&lt;#&gt;</a:t>
             </a:fld>
           </a:p>
@@ -403,7 +401,7 @@
         <p:txBody>
           <a:bodyPr/>
           <a:p>
-            <a:fld id="{A22088C8-3FD6-4716-8EBD-EC2657981427}" type="slidenum">
+            <a:fld id="{D2CEF144-5885-4703-A498-306DD3D81CFF}" type="slidenum">
               <a:t>&lt;#&gt;</a:t>
             </a:fld>
           </a:p>
@@ -528,7 +526,7 @@
         <p:txBody>
           <a:bodyPr/>
           <a:p>
-            <a:fld id="{FA251B96-95CC-4686-9567-C619FBA53E63}" type="slidenum">
+            <a:fld id="{20F98A72-392F-48FD-B59A-21F7BA3C938D}" type="slidenum">
               <a:t>&lt;#&gt;</a:t>
             </a:fld>
           </a:p>
@@ -653,7 +651,7 @@
         <p:txBody>
           <a:bodyPr/>
           <a:p>
-            <a:fld id="{CB5A40B5-3D68-4EE9-A6E9-4D2DCE062FA4}" type="slidenum">
+            <a:fld id="{A0D7922D-4143-4630-8646-DD25DBA98B28}" type="slidenum">
               <a:t>&lt;#&gt;</a:t>
             </a:fld>
           </a:p>
@@ -775,7 +773,7 @@
         <p:txBody>
           <a:bodyPr/>
           <a:p>
-            <a:fld id="{A75388BD-BBDF-42FB-8AC7-FFC31536910C}" type="slidenum">
+            <a:fld id="{156CE681-CD76-478F-9E56-B522EFBF1A7C}" type="slidenum">
               <a:t>&lt;#&gt;</a:t>
             </a:fld>
           </a:p>
@@ -900,7 +898,7 @@
         <p:txBody>
           <a:bodyPr/>
           <a:p>
-            <a:fld id="{52534736-B6C4-4234-A111-5A825F4A6DA5}" type="slidenum">
+            <a:fld id="{BD665C6F-A630-4FF5-BD47-115123D81F6C}" type="slidenum">
               <a:t>&lt;#&gt;</a:t>
             </a:fld>
           </a:p>
@@ -1025,7 +1023,7 @@
         <p:txBody>
           <a:bodyPr/>
           <a:p>
-            <a:fld id="{F8C9E8E6-111B-44BA-9EDF-49B4FA37AC50}" type="slidenum">
+            <a:fld id="{0E74F832-1758-4D86-874E-CD7C17E4E1BC}" type="slidenum">
               <a:t>&lt;#&gt;</a:t>
             </a:fld>
           </a:p>
@@ -1150,7 +1148,7 @@
         <p:txBody>
           <a:bodyPr/>
           <a:p>
-            <a:fld id="{5E609479-2C5C-4676-9595-BE191F88C001}" type="slidenum">
+            <a:fld id="{3F5D0F2D-8105-4764-A38F-A6E854F51D47}" type="slidenum">
               <a:t>&lt;#&gt;</a:t>
             </a:fld>
           </a:p>
@@ -1496,7 +1494,16 @@
                 </a:solidFill>
                 <a:latin typeface="Arial"/>
               </a:rPr>
-              <a:t>Seventh Outline Level</a:t>
+              <a:t>Seventh Outline </a:t>
+            </a:r>
+            <a:r>
+              <a:rPr b="0" lang="es-ES" sz="1800" spc="-1" strike="noStrike">
+                <a:solidFill>
+                  <a:srgbClr val="000000"/>
+                </a:solidFill>
+                <a:latin typeface="Arial"/>
+              </a:rPr>
+              <a:t>Level</a:t>
             </a:r>
             <a:endParaRPr b="0" lang="es-ES" sz="1800" spc="-1" strike="noStrike">
               <a:solidFill>
@@ -1562,7 +1569,7 @@
                 <a:tab algn="l" pos="0"/>
               </a:tabLst>
             </a:pPr>
-            <a:fld id="{2A438782-4B06-4459-857A-1BA997FCF43B}" type="slidenum">
+            <a:fld id="{DA1BD91E-A369-4D30-A891-F2AE7F8E80CC}" type="slidenum">
               <a:rPr b="0" lang="en-GB" sz="1000" spc="-1" strike="noStrike">
                 <a:solidFill>
                   <a:schemeClr val="dk2"/>
@@ -1944,7 +1951,7 @@
                 <a:tab algn="l" pos="0"/>
               </a:tabLst>
             </a:pPr>
-            <a:fld id="{01E8ECEE-0909-49B7-8AF6-898A8B7DF869}" type="slidenum">
+            <a:fld id="{11FDC012-A178-406C-88F1-48ED0CCC59D8}" type="slidenum">
               <a:rPr b="0" lang="en-GB" sz="1000" spc="-1" strike="noStrike">
                 <a:solidFill>
                   <a:schemeClr val="dk2"/>
@@ -2326,7 +2333,7 @@
                 <a:tab algn="l" pos="0"/>
               </a:tabLst>
             </a:pPr>
-            <a:fld id="{74A8BA1C-09AD-4CB2-A390-C513B20EF9C6}" type="slidenum">
+            <a:fld id="{68BD6A3A-A19A-4ED4-8F67-042BF607E66F}" type="slidenum">
               <a:rPr b="0" lang="en-GB" sz="1000" spc="-1" strike="noStrike">
                 <a:solidFill>
                   <a:schemeClr val="dk2"/>
@@ -2708,7 +2715,7 @@
                 <a:tab algn="l" pos="0"/>
               </a:tabLst>
             </a:pPr>
-            <a:fld id="{671C0F1C-65DB-4EA0-8A03-F39C28FC15A7}" type="slidenum">
+            <a:fld id="{93062BD4-E628-4625-B637-92069D21DCA1}" type="slidenum">
               <a:rPr b="0" lang="en-GB" sz="1000" spc="-1" strike="noStrike">
                 <a:solidFill>
                   <a:schemeClr val="dk2"/>
@@ -3090,7 +3097,7 @@
                 <a:tab algn="l" pos="0"/>
               </a:tabLst>
             </a:pPr>
-            <a:fld id="{E82A57E9-645A-4A43-ACFD-AD4A3E412028}" type="slidenum">
+            <a:fld id="{38DD04D3-DC4E-4892-8394-84E650E2007C}" type="slidenum">
               <a:rPr b="0" lang="en-GB" sz="1000" spc="-1" strike="noStrike">
                 <a:solidFill>
                   <a:schemeClr val="dk2"/>
@@ -3247,7 +3254,7 @@
                 <a:tab algn="l" pos="0"/>
               </a:tabLst>
             </a:pPr>
-            <a:fld id="{54358BAF-CBCF-41EA-9E16-1ACFA27BAAC6}" type="slidenum">
+            <a:fld id="{CC117800-2D58-4A49-81AD-DA089620DB1E}" type="slidenum">
               <a:rPr b="0" lang="en-GB" sz="1000" spc="-1" strike="noStrike">
                 <a:solidFill>
                   <a:schemeClr val="dk2"/>
@@ -3854,7 +3861,7 @@
                 <a:tab algn="l" pos="0"/>
               </a:tabLst>
             </a:pPr>
-            <a:fld id="{EF8FCE63-8172-4EF7-B3B5-2D95E1264D81}" type="slidenum">
+            <a:fld id="{EDE1346F-CC1F-4C1D-901A-5BB7BA7BF261}" type="slidenum">
               <a:rPr b="0" lang="en-GB" sz="1000" spc="-1" strike="noStrike">
                 <a:solidFill>
                   <a:schemeClr val="dk2"/>
@@ -4236,7 +4243,7 @@
                 <a:tab algn="l" pos="0"/>
               </a:tabLst>
             </a:pPr>
-            <a:fld id="{227303EE-F47B-4053-983B-0E34DCB06A5C}" type="slidenum">
+            <a:fld id="{62BF0913-8228-4579-8C57-5AD555E9A465}" type="slidenum">
               <a:rPr b="0" lang="en-GB" sz="1000" spc="-1" strike="noStrike">
                 <a:solidFill>
                   <a:schemeClr val="dk2"/>
@@ -4618,7 +4625,7 @@
                 <a:tab algn="l" pos="0"/>
               </a:tabLst>
             </a:pPr>
-            <a:fld id="{4003CED7-67DB-4399-9B27-89E1DAB341A0}" type="slidenum">
+            <a:fld id="{68D06125-5A44-429C-8F52-AE4E53950CF2}" type="slidenum">
               <a:rPr b="0" lang="en-GB" sz="1000" spc="-1" strike="noStrike">
                 <a:solidFill>
                   <a:schemeClr val="dk2"/>
@@ -4768,7 +4775,7 @@
       </p:grpSpPr>
       <p:sp>
         <p:nvSpPr>
-          <p:cNvPr id="77" name="PlaceHolder 1"/>
+          <p:cNvPr id="78" name="PlaceHolder 1"/>
           <p:cNvSpPr>
             <a:spLocks noGrp="1"/>
           </p:cNvSpPr>
@@ -4815,9 +4822,8 @@
                   <a:srgbClr val="000000"/>
                 </a:solidFill>
                 <a:latin typeface="Arial"/>
-                <a:ea typeface="Noto Sans CJK SC"/>
-              </a:rPr>
-              <a:t>Incrustados</a:t>
+              </a:rPr>
+              <a:t>Conectados con un plugin</a:t>
             </a:r>
             <a:r>
               <a:rPr b="0" lang="es-ES" sz="1500" spc="-1" strike="noStrike">
@@ -4825,9 +4831,8 @@
                   <a:srgbClr val="000000"/>
                 </a:solidFill>
                 <a:latin typeface="Arial"/>
-                <a:ea typeface="Noto Sans CJK SC"/>
-              </a:rPr>
-              <a:t> ˁ˚ᴥ˚ˀ</a:t>
+              </a:rPr>
+              <a:t> ᒡ◯ᵔ◯ᒢ</a:t>
             </a:r>
             <a:endParaRPr b="0" lang="es-ES" sz="1500" spc="-1" strike="noStrike">
               <a:solidFill>
@@ -4840,7 +4845,7 @@
       </p:sp>
       <p:sp>
         <p:nvSpPr>
-          <p:cNvPr id="78" name="PlaceHolder 2"/>
+          <p:cNvPr id="79" name="PlaceHolder 2"/>
           <p:cNvSpPr>
             <a:spLocks noGrp="1"/>
           </p:cNvSpPr>
@@ -4850,8 +4855,8 @@
         </p:nvSpPr>
         <p:spPr>
           <a:xfrm>
-            <a:off x="311760" y="1337400"/>
-            <a:ext cx="8518680" cy="3240720"/>
+            <a:off x="311760" y="1461600"/>
+            <a:ext cx="8518680" cy="3116520"/>
           </a:xfrm>
           <a:prstGeom prst="rect">
             <a:avLst/>
@@ -4863,371 +4868,14 @@
         </p:spPr>
         <p:txBody>
           <a:bodyPr lIns="91440" rIns="91440" tIns="91440" bIns="91440" anchor="t">
-            <a:normAutofit fontScale="56111"/>
+            <a:normAutofit/>
           </a:bodyPr>
           <a:p>
             <a:pPr indent="0">
-              <a:lnSpc>
-                <a:spcPct val="100000"/>
-              </a:lnSpc>
-              <a:spcBef>
-                <a:spcPts val="340"/>
-              </a:spcBef>
-              <a:spcAft>
-                <a:spcPts val="283"/>
-              </a:spcAft>
+              <a:spcBef>
+                <a:spcPts val="1417"/>
+              </a:spcBef>
               <a:buNone/>
-              <a:tabLst>
-                <a:tab algn="l" pos="0"/>
-              </a:tabLst>
-            </a:pPr>
-            <a:r>
-              <a:rPr b="0" lang="es-ES" sz="1800" spc="-1" strike="noStrike">
-                <a:solidFill>
-                  <a:srgbClr val="000000"/>
-                </a:solidFill>
-                <a:latin typeface="Arial"/>
-              </a:rPr>
-              <a:t>La mayoría de CRM dan códigos para incrustar formularios en tu web. Son códigos muy sencillos de usar, generas el formulario y cortas y pegas el código que te dan en tu web, en páginas, widgets, …</a:t>
-            </a:r>
-            <a:endParaRPr b="0" lang="es-ES" sz="1800" spc="-1" strike="noStrike">
-              <a:solidFill>
-                <a:srgbClr val="000000"/>
-              </a:solidFill>
-              <a:latin typeface="Arial"/>
-            </a:endParaRPr>
-          </a:p>
-          <a:p>
-            <a:pPr indent="0">
-              <a:lnSpc>
-                <a:spcPct val="100000"/>
-              </a:lnSpc>
-              <a:spcBef>
-                <a:spcPts val="340"/>
-              </a:spcBef>
-              <a:spcAft>
-                <a:spcPts val="283"/>
-              </a:spcAft>
-              <a:buNone/>
-              <a:tabLst>
-                <a:tab algn="l" pos="0"/>
-              </a:tabLst>
-            </a:pPr>
-            <a:r>
-              <a:rPr b="1" lang="es-ES" sz="1800" spc="-1" strike="noStrike">
-                <a:solidFill>
-                  <a:srgbClr val="000000"/>
-                </a:solidFill>
-                <a:latin typeface="Arial"/>
-              </a:rPr>
-              <a:t>Ventajas:</a:t>
-            </a:r>
-            <a:endParaRPr b="0" lang="es-ES" sz="1800" spc="-1" strike="noStrike">
-              <a:solidFill>
-                <a:srgbClr val="000000"/>
-              </a:solidFill>
-              <a:latin typeface="Arial"/>
-            </a:endParaRPr>
-          </a:p>
-          <a:p>
-            <a:pPr marL="720000" indent="-324000">
-              <a:lnSpc>
-                <a:spcPct val="100000"/>
-              </a:lnSpc>
-              <a:spcBef>
-                <a:spcPts val="340"/>
-              </a:spcBef>
-              <a:spcAft>
-                <a:spcPts val="283"/>
-              </a:spcAft>
-              <a:buClr>
-                <a:srgbClr val="000000"/>
-              </a:buClr>
-              <a:buFont typeface="Wingdings" charset="2"/>
-              <a:buChar char=""/>
-              <a:tabLst>
-                <a:tab algn="l" pos="0"/>
-              </a:tabLst>
-            </a:pPr>
-            <a:r>
-              <a:rPr b="0" lang="es-ES" sz="1800" spc="-1" strike="noStrike">
-                <a:solidFill>
-                  <a:srgbClr val="000000"/>
-                </a:solidFill>
-                <a:latin typeface="Arial"/>
-              </a:rPr>
-              <a:t>Muy fácil de crear e integrar y exigen pocos conocimientos.</a:t>
-            </a:r>
-            <a:endParaRPr b="0" lang="es-ES" sz="1800" spc="-1" strike="noStrike">
-              <a:solidFill>
-                <a:srgbClr val="000000"/>
-              </a:solidFill>
-              <a:latin typeface="Arial"/>
-            </a:endParaRPr>
-          </a:p>
-          <a:p>
-            <a:pPr marL="720000" indent="-324000">
-              <a:lnSpc>
-                <a:spcPct val="100000"/>
-              </a:lnSpc>
-              <a:spcBef>
-                <a:spcPts val="340"/>
-              </a:spcBef>
-              <a:spcAft>
-                <a:spcPts val="283"/>
-              </a:spcAft>
-              <a:buClr>
-                <a:srgbClr val="000000"/>
-              </a:buClr>
-              <a:buFont typeface="Wingdings" charset="2"/>
-              <a:buChar char=""/>
-              <a:tabLst>
-                <a:tab algn="l" pos="0"/>
-              </a:tabLst>
-            </a:pPr>
-            <a:r>
-              <a:rPr b="0" lang="es-ES" sz="1800" spc="-1" strike="noStrike">
-                <a:solidFill>
-                  <a:srgbClr val="000000"/>
-                </a:solidFill>
-                <a:latin typeface="Arial"/>
-              </a:rPr>
-              <a:t>La conexión es directa, no debería haber fallos.</a:t>
-            </a:r>
-            <a:endParaRPr b="0" lang="es-ES" sz="1800" spc="-1" strike="noStrike">
-              <a:solidFill>
-                <a:srgbClr val="000000"/>
-              </a:solidFill>
-              <a:latin typeface="Arial"/>
-            </a:endParaRPr>
-          </a:p>
-          <a:p>
-            <a:pPr marL="720000" indent="-324000">
-              <a:lnSpc>
-                <a:spcPct val="100000"/>
-              </a:lnSpc>
-              <a:spcBef>
-                <a:spcPts val="340"/>
-              </a:spcBef>
-              <a:spcAft>
-                <a:spcPts val="283"/>
-              </a:spcAft>
-              <a:buClr>
-                <a:srgbClr val="000000"/>
-              </a:buClr>
-              <a:buFont typeface="Wingdings" charset="2"/>
-              <a:buChar char=""/>
-              <a:tabLst>
-                <a:tab algn="l" pos="0"/>
-              </a:tabLst>
-            </a:pPr>
-            <a:r>
-              <a:rPr b="0" lang="es-ES" sz="1800" spc="-1" strike="noStrike">
-                <a:solidFill>
-                  <a:srgbClr val="000000"/>
-                </a:solidFill>
-                <a:latin typeface="Arial"/>
-              </a:rPr>
-              <a:t>Ellos se encargan de meter la cookie de rastreo o similares para poder seguir al usuario.</a:t>
-            </a:r>
-            <a:endParaRPr b="0" lang="es-ES" sz="1800" spc="-1" strike="noStrike">
-              <a:solidFill>
-                <a:srgbClr val="000000"/>
-              </a:solidFill>
-              <a:latin typeface="Arial"/>
-            </a:endParaRPr>
-          </a:p>
-          <a:p>
-            <a:pPr indent="0">
-              <a:lnSpc>
-                <a:spcPct val="100000"/>
-              </a:lnSpc>
-              <a:spcBef>
-                <a:spcPts val="340"/>
-              </a:spcBef>
-              <a:spcAft>
-                <a:spcPts val="283"/>
-              </a:spcAft>
-              <a:buNone/>
-              <a:tabLst>
-                <a:tab algn="l" pos="0"/>
-              </a:tabLst>
-            </a:pPr>
-            <a:r>
-              <a:rPr b="1" lang="es-ES" sz="1800" spc="-1" strike="noStrike">
-                <a:solidFill>
-                  <a:srgbClr val="000000"/>
-                </a:solidFill>
-                <a:latin typeface="Arial"/>
-              </a:rPr>
-              <a:t>Desventajas:</a:t>
-            </a:r>
-            <a:endParaRPr b="0" lang="es-ES" sz="1800" spc="-1" strike="noStrike">
-              <a:solidFill>
-                <a:srgbClr val="000000"/>
-              </a:solidFill>
-              <a:latin typeface="Arial"/>
-            </a:endParaRPr>
-          </a:p>
-          <a:p>
-            <a:pPr marL="720000" indent="-324000">
-              <a:lnSpc>
-                <a:spcPct val="100000"/>
-              </a:lnSpc>
-              <a:spcBef>
-                <a:spcPts val="340"/>
-              </a:spcBef>
-              <a:spcAft>
-                <a:spcPts val="283"/>
-              </a:spcAft>
-              <a:buClr>
-                <a:srgbClr val="000000"/>
-              </a:buClr>
-              <a:buFont typeface="Wingdings" charset="2"/>
-              <a:buChar char=""/>
-              <a:tabLst>
-                <a:tab algn="l" pos="0"/>
-              </a:tabLst>
-            </a:pPr>
-            <a:r>
-              <a:rPr b="0" lang="es-ES" sz="1800" spc="-1" strike="noStrike">
-                <a:solidFill>
-                  <a:srgbClr val="000000"/>
-                </a:solidFill>
-                <a:latin typeface="Arial"/>
-              </a:rPr>
-              <a:t>Cuando quieres meter campos especiales que no están en el CRM, te obliga a crear campus personalizados en el CRM para guardar esa información. A la larga creas montones de campos que casi ni se usan.</a:t>
-            </a:r>
-            <a:endParaRPr b="0" lang="es-ES" sz="1800" spc="-1" strike="noStrike">
-              <a:solidFill>
-                <a:srgbClr val="000000"/>
-              </a:solidFill>
-              <a:latin typeface="Arial"/>
-            </a:endParaRPr>
-          </a:p>
-          <a:p>
-            <a:pPr marL="720000" indent="-324000">
-              <a:lnSpc>
-                <a:spcPct val="100000"/>
-              </a:lnSpc>
-              <a:spcBef>
-                <a:spcPts val="340"/>
-              </a:spcBef>
-              <a:spcAft>
-                <a:spcPts val="283"/>
-              </a:spcAft>
-              <a:buClr>
-                <a:srgbClr val="000000"/>
-              </a:buClr>
-              <a:buFont typeface="Wingdings" charset="2"/>
-              <a:buChar char=""/>
-              <a:tabLst>
-                <a:tab algn="l" pos="0"/>
-              </a:tabLst>
-            </a:pPr>
-            <a:r>
-              <a:rPr b="0" lang="es-ES" sz="1800" spc="-1" strike="noStrike">
-                <a:solidFill>
-                  <a:srgbClr val="000000"/>
-                </a:solidFill>
-                <a:latin typeface="Arial"/>
-              </a:rPr>
-              <a:t>No tienen buena integración en el diseño de tu WordPress y suelen quedar un poco pegote.</a:t>
-            </a:r>
-            <a:endParaRPr b="0" lang="es-ES" sz="1800" spc="-1" strike="noStrike">
-              <a:solidFill>
-                <a:srgbClr val="000000"/>
-              </a:solidFill>
-              <a:latin typeface="Arial"/>
-            </a:endParaRPr>
-          </a:p>
-          <a:p>
-            <a:pPr marL="720000" indent="-324000">
-              <a:lnSpc>
-                <a:spcPct val="100000"/>
-              </a:lnSpc>
-              <a:spcBef>
-                <a:spcPts val="340"/>
-              </a:spcBef>
-              <a:spcAft>
-                <a:spcPts val="283"/>
-              </a:spcAft>
-              <a:buClr>
-                <a:srgbClr val="000000"/>
-              </a:buClr>
-              <a:buFont typeface="Wingdings" charset="2"/>
-              <a:buChar char=""/>
-              <a:tabLst>
-                <a:tab algn="l" pos="0"/>
-              </a:tabLst>
-            </a:pPr>
-            <a:r>
-              <a:rPr b="0" lang="es-ES" sz="1800" spc="-1" strike="noStrike">
-                <a:solidFill>
-                  <a:srgbClr val="000000"/>
-                </a:solidFill>
-                <a:latin typeface="Arial"/>
-              </a:rPr>
-              <a:t>No permiten conectar a terceros. Los formularios incrustados se conectan difícilmente con elementos de terceros. Tengo una fundación de una empresa grande que todos los contactos recogidos con los formularios deben registrarse en el CRM que usan ellos (Clientify) y con el de la empresa matriz (Salesforce). Los formularios incrustados de Clientify no permiten hacer una conexión también a Salesforce cumpliendo los requerimientos que Salesforce exige.</a:t>
-            </a:r>
-            <a:endParaRPr b="0" lang="es-ES" sz="1800" spc="-1" strike="noStrike">
-              <a:solidFill>
-                <a:srgbClr val="000000"/>
-              </a:solidFill>
-              <a:latin typeface="Arial"/>
-            </a:endParaRPr>
-          </a:p>
-          <a:p>
-            <a:pPr marL="720000" indent="-324000">
-              <a:lnSpc>
-                <a:spcPct val="100000"/>
-              </a:lnSpc>
-              <a:spcBef>
-                <a:spcPts val="340"/>
-              </a:spcBef>
-              <a:spcAft>
-                <a:spcPts val="283"/>
-              </a:spcAft>
-              <a:buClr>
-                <a:srgbClr val="000000"/>
-              </a:buClr>
-              <a:buFont typeface="Wingdings" charset="2"/>
-              <a:buChar char=""/>
-              <a:tabLst>
-                <a:tab algn="l" pos="0"/>
-              </a:tabLst>
-            </a:pPr>
-            <a:r>
-              <a:rPr b="0" lang="es-ES" sz="1800" spc="-1" strike="noStrike">
-                <a:solidFill>
-                  <a:srgbClr val="000000"/>
-                </a:solidFill>
-                <a:latin typeface="Arial"/>
-              </a:rPr>
-              <a:t>Si cae el CRM caen los formularios de tu web. No suelen fallar, pero puede pasar.</a:t>
-            </a:r>
-            <a:endParaRPr b="0" lang="es-ES" sz="1800" spc="-1" strike="noStrike">
-              <a:solidFill>
-                <a:srgbClr val="000000"/>
-              </a:solidFill>
-              <a:latin typeface="Arial"/>
-            </a:endParaRPr>
-          </a:p>
-          <a:p>
-            <a:pPr indent="0">
-              <a:lnSpc>
-                <a:spcPct val="100000"/>
-              </a:lnSpc>
-              <a:spcBef>
-                <a:spcPts val="1191"/>
-              </a:spcBef>
-              <a:spcAft>
-                <a:spcPts val="992"/>
-              </a:spcAft>
-              <a:buNone/>
-              <a:tabLst>
-                <a:tab algn="l" pos="0"/>
-              </a:tabLst>
             </a:pPr>
             <a:endParaRPr b="0" lang="es-ES" sz="1800" spc="-1" strike="noStrike">
               <a:solidFill>
@@ -5240,7 +4888,7 @@
       </p:sp>
       <p:sp>
         <p:nvSpPr>
-          <p:cNvPr id="79" name="PlaceHolder 3"/>
+          <p:cNvPr id="80" name="PlaceHolder 3"/>
           <p:cNvSpPr>
             <a:spLocks noGrp="1"/>
           </p:cNvSpPr>
@@ -5284,7 +4932,7 @@
             <a:r>
               <a:rPr b="1" lang="es-ES" sz="1800" spc="-1" strike="noStrike">
                 <a:solidFill>
-                  <a:srgbClr val="000000"/>
+                  <a:srgbClr val="174575"/>
                 </a:solidFill>
                 <a:latin typeface="Arial"/>
               </a:rPr>
@@ -5293,7 +4941,7 @@
             <a:r>
               <a:rPr b="0" lang="es-ES" sz="1800" spc="-1" strike="noStrike">
                 <a:solidFill>
-                  <a:srgbClr val="000000"/>
+                  <a:srgbClr val="174575"/>
                 </a:solidFill>
                 <a:latin typeface="Arial"/>
               </a:rPr>
@@ -5340,7 +4988,7 @@
       </p:grpSpPr>
       <p:sp>
         <p:nvSpPr>
-          <p:cNvPr id="80" name="PlaceHolder 1"/>
+          <p:cNvPr id="81" name="PlaceHolder 1"/>
           <p:cNvSpPr>
             <a:spLocks noGrp="1"/>
           </p:cNvSpPr>
@@ -5388,7 +5036,7 @@
                 </a:solidFill>
                 <a:latin typeface="Arial"/>
               </a:rPr>
-              <a:t>Conectados con un plugin</a:t>
+              <a:t>Conectados con un desarrollo propio</a:t>
             </a:r>
             <a:r>
               <a:rPr b="0" lang="es-ES" sz="1500" spc="-1" strike="noStrike">
@@ -5397,7 +5045,7 @@
                 </a:solidFill>
                 <a:latin typeface="Arial"/>
               </a:rPr>
-              <a:t> ᒡ◯ᵔ◯ᒢ</a:t>
+              <a:t> []_ ([]) []_</a:t>
             </a:r>
             <a:endParaRPr b="0" lang="es-ES" sz="1500" spc="-1" strike="noStrike">
               <a:solidFill>
@@ -5410,7 +5058,7 @@
       </p:sp>
       <p:sp>
         <p:nvSpPr>
-          <p:cNvPr id="81" name="PlaceHolder 2"/>
+          <p:cNvPr id="82" name="PlaceHolder 2"/>
           <p:cNvSpPr>
             <a:spLocks noGrp="1"/>
           </p:cNvSpPr>
@@ -5453,7 +5101,7 @@
       </p:sp>
       <p:sp>
         <p:nvSpPr>
-          <p:cNvPr id="82" name="PlaceHolder 3"/>
+          <p:cNvPr id="83" name="PlaceHolder 3"/>
           <p:cNvSpPr>
             <a:spLocks noGrp="1"/>
           </p:cNvSpPr>
@@ -5553,18 +5201,18 @@
       </p:grpSpPr>
       <p:sp>
         <p:nvSpPr>
-          <p:cNvPr id="83" name="PlaceHolder 1"/>
+          <p:cNvPr id="84" name="PlaceHolder 1"/>
           <p:cNvSpPr>
             <a:spLocks noGrp="1"/>
           </p:cNvSpPr>
           <p:nvPr>
-            <p:ph type="title"/>
+            <p:ph/>
           </p:nvPr>
         </p:nvSpPr>
         <p:spPr>
           <a:xfrm>
-            <a:off x="311760" y="815760"/>
-            <a:ext cx="8518680" cy="520920"/>
+            <a:off x="360000" y="3240000"/>
+            <a:ext cx="8518680" cy="1259640"/>
           </a:xfrm>
           <a:prstGeom prst="rect">
             <a:avLst/>
@@ -5579,40 +5227,89 @@
             <a:normAutofit/>
           </a:bodyPr>
           <a:p>
-            <a:pPr indent="0" algn="r">
+            <a:pPr marL="432000" indent="-324000">
               <a:lnSpc>
                 <a:spcPct val="100000"/>
               </a:lnSpc>
               <a:spcBef>
-                <a:spcPts val="1191"/>
+                <a:spcPts val="624"/>
               </a:spcBef>
               <a:spcAft>
-                <a:spcPts val="992"/>
+                <a:spcPts val="425"/>
               </a:spcAft>
-              <a:buNone/>
-              <a:tabLst>
-                <a:tab algn="l" pos="0"/>
-              </a:tabLst>
-            </a:pPr>
-            <a:r>
-              <a:rPr b="1" lang="es-ES" sz="1500" spc="-1" strike="noStrike">
-                <a:solidFill>
-                  <a:srgbClr val="000000"/>
-                </a:solidFill>
-                <a:latin typeface="Arial"/>
-              </a:rPr>
-              <a:t>Conectados con un desarrollo propio</a:t>
-            </a:r>
-            <a:r>
-              <a:rPr b="0" lang="es-ES" sz="1500" spc="-1" strike="noStrike">
-                <a:solidFill>
-                  <a:srgbClr val="000000"/>
-                </a:solidFill>
-                <a:latin typeface="Arial"/>
-              </a:rPr>
-              <a:t> []_ ([]) []_</a:t>
-            </a:r>
-            <a:endParaRPr b="0" lang="es-ES" sz="1500" spc="-1" strike="noStrike">
+              <a:buClr>
+                <a:srgbClr val="000000"/>
+              </a:buClr>
+              <a:buSzPct val="45000"/>
+              <a:buFont typeface="Wingdings" charset="2"/>
+              <a:buChar char=""/>
+            </a:pPr>
+            <a:r>
+              <a:rPr b="1" lang="es-ES" sz="1300" spc="-1" strike="noStrike">
+                <a:solidFill>
+                  <a:srgbClr val="000000"/>
+                </a:solidFill>
+                <a:latin typeface="Arial"/>
+                <a:ea typeface="Noto Sans CJK SC"/>
+              </a:rPr>
+              <a:t>No son desarrollos complicados</a:t>
+            </a:r>
+            <a:r>
+              <a:rPr b="0" lang="es-ES" sz="1300" spc="-1" strike="noStrike">
+                <a:solidFill>
+                  <a:srgbClr val="000000"/>
+                </a:solidFill>
+                <a:latin typeface="Arial"/>
+                <a:ea typeface="Noto Sans CJK SC"/>
+              </a:rPr>
+              <a:t>, son casi siempre tema de POST/GET de los datos y montarlos en un formulario. Se pueden complicar cuando metemos fotos o documentos como CV en PDF, por ejemplo.</a:t>
+            </a:r>
+            <a:endParaRPr b="0" lang="es-ES" sz="1300" spc="-1" strike="noStrike">
+              <a:solidFill>
+                <a:srgbClr val="000000"/>
+              </a:solidFill>
+              <a:latin typeface="Arial"/>
+            </a:endParaRPr>
+          </a:p>
+          <a:p>
+            <a:pPr marL="432000" indent="-324000">
+              <a:lnSpc>
+                <a:spcPct val="100000"/>
+              </a:lnSpc>
+              <a:spcBef>
+                <a:spcPts val="624"/>
+              </a:spcBef>
+              <a:spcAft>
+                <a:spcPts val="425"/>
+              </a:spcAft>
+              <a:buClr>
+                <a:srgbClr val="000000"/>
+              </a:buClr>
+              <a:buSzPct val="45000"/>
+              <a:buFont typeface="Wingdings" charset="2"/>
+              <a:buChar char=""/>
+            </a:pPr>
+            <a:r>
+              <a:rPr b="1" lang="es-ES" sz="1300" spc="-1" strike="noStrike">
+                <a:solidFill>
+                  <a:srgbClr val="000000"/>
+                </a:solidFill>
+                <a:latin typeface="Arial"/>
+                <a:ea typeface="Noto Sans CJK SC"/>
+              </a:rPr>
+              <a:t>No debemos almacenar contraseñas en nuestro CRM</a:t>
+            </a:r>
+            <a:r>
+              <a:rPr b="0" lang="es-ES" sz="1300" spc="-1" strike="noStrike">
+                <a:solidFill>
+                  <a:srgbClr val="000000"/>
+                </a:solidFill>
+                <a:latin typeface="Arial"/>
+                <a:ea typeface="Noto Sans CJK SC"/>
+              </a:rPr>
+              <a:t>, lo suyo es usar el login/registro de WordPress o generar algún tipo de «hash» temporal que se envíe al correo, así la gestión de seguridad la hace el correo.</a:t>
+            </a:r>
+            <a:endParaRPr b="0" lang="es-ES" sz="1300" spc="-1" strike="noStrike">
               <a:solidFill>
                 <a:srgbClr val="000000"/>
               </a:solidFill>
@@ -5623,50 +5320,7 @@
       </p:sp>
       <p:sp>
         <p:nvSpPr>
-          <p:cNvPr id="84" name="PlaceHolder 2"/>
-          <p:cNvSpPr>
-            <a:spLocks noGrp="1"/>
-          </p:cNvSpPr>
-          <p:nvPr>
-            <p:ph/>
-          </p:nvPr>
-        </p:nvSpPr>
-        <p:spPr>
-          <a:xfrm>
-            <a:off x="311760" y="1461600"/>
-            <a:ext cx="8518680" cy="3116520"/>
-          </a:xfrm>
-          <a:prstGeom prst="rect">
-            <a:avLst/>
-          </a:prstGeom>
-          <a:noFill/>
-          <a:ln w="0">
-            <a:noFill/>
-          </a:ln>
-        </p:spPr>
-        <p:txBody>
-          <a:bodyPr lIns="91440" rIns="91440" tIns="91440" bIns="91440" anchor="t">
-            <a:normAutofit/>
-          </a:bodyPr>
-          <a:p>
-            <a:pPr indent="0">
-              <a:spcBef>
-                <a:spcPts val="1417"/>
-              </a:spcBef>
-              <a:buNone/>
-            </a:pPr>
-            <a:endParaRPr b="0" lang="es-ES" sz="1800" spc="-1" strike="noStrike">
-              <a:solidFill>
-                <a:srgbClr val="000000"/>
-              </a:solidFill>
-              <a:latin typeface="Arial"/>
-            </a:endParaRPr>
-          </a:p>
-        </p:txBody>
-      </p:sp>
-      <p:sp>
-        <p:nvSpPr>
-          <p:cNvPr id="85" name="PlaceHolder 3"/>
+          <p:cNvPr id="85" name="PlaceHolder 2"/>
           <p:cNvSpPr>
             <a:spLocks noGrp="1"/>
           </p:cNvSpPr>
@@ -5676,7 +5330,7 @@
         </p:nvSpPr>
         <p:spPr>
           <a:xfrm>
-            <a:off x="2329200" y="294480"/>
+            <a:off x="2329560" y="294840"/>
             <a:ext cx="6490440" cy="520920"/>
           </a:xfrm>
           <a:prstGeom prst="rect">
@@ -5714,7 +5368,7 @@
                 </a:solidFill>
                 <a:latin typeface="Arial"/>
               </a:rPr>
-              <a:t>Formularios </a:t>
+              <a:t>Perfiles de usuarios </a:t>
             </a:r>
             <a:r>
               <a:rPr b="0" lang="es-ES" sz="1800" spc="-1" strike="noStrike">
@@ -5723,9 +5377,265 @@
                 </a:solidFill>
                 <a:latin typeface="Arial"/>
               </a:rPr>
-              <a:t>[̲̅$̲̅(̲̅ιοο̲̅)̲̅$̲̅]</a:t>
+              <a:t> ¦̵̱ ̵̱ ̵̱ ̵̱ ̵̱(̢ ̡͇̅└͇̅┘͇̅ (▤8</a:t>
+            </a:r>
+            <a:r>
+              <a:rPr b="0" lang="hi-IN" sz="1800" spc="-1" strike="noStrike">
+                <a:solidFill>
+                  <a:srgbClr val="174575"/>
+                </a:solidFill>
+                <a:latin typeface="Arial"/>
+              </a:rPr>
+              <a:t>כ</a:t>
+            </a:r>
+            <a:r>
+              <a:rPr b="0" lang="es-ES" sz="1800" spc="-1" strike="noStrike">
+                <a:solidFill>
+                  <a:srgbClr val="174575"/>
+                </a:solidFill>
+                <a:latin typeface="Arial"/>
+              </a:rPr>
+              <a:t>−◦</a:t>
             </a:r>
             <a:endParaRPr b="0" lang="es-ES" sz="1800" spc="-1" strike="noStrike">
+              <a:solidFill>
+                <a:srgbClr val="000000"/>
+              </a:solidFill>
+              <a:latin typeface="Arial"/>
+            </a:endParaRPr>
+          </a:p>
+        </p:txBody>
+      </p:sp>
+      <p:sp>
+        <p:nvSpPr>
+          <p:cNvPr id="86" name="PlaceHolder 10"/>
+          <p:cNvSpPr/>
+          <p:nvPr/>
+        </p:nvSpPr>
+        <p:spPr>
+          <a:xfrm>
+            <a:off x="360000" y="900000"/>
+            <a:ext cx="8639640" cy="1800000"/>
+          </a:xfrm>
+          <a:prstGeom prst="rect">
+            <a:avLst/>
+          </a:prstGeom>
+          <a:noFill/>
+          <a:ln w="0">
+            <a:noFill/>
+          </a:ln>
+        </p:spPr>
+        <p:style>
+          <a:lnRef idx="0"/>
+          <a:fillRef idx="0"/>
+          <a:effectRef idx="0"/>
+          <a:fontRef idx="minor"/>
+        </p:style>
+        <p:txBody>
+          <a:bodyPr lIns="90000" rIns="90000" tIns="91440" bIns="91440" anchor="t">
+            <a:normAutofit/>
+          </a:bodyPr>
+          <a:p>
+            <a:pPr>
+              <a:lnSpc>
+                <a:spcPct val="100000"/>
+              </a:lnSpc>
+              <a:spcBef>
+                <a:spcPts val="850"/>
+              </a:spcBef>
+              <a:spcAft>
+                <a:spcPts val="850"/>
+              </a:spcAft>
+            </a:pPr>
+            <a:r>
+              <a:rPr b="0" lang="es-ES" sz="1300" spc="-1" strike="noStrike">
+                <a:solidFill>
+                  <a:srgbClr val="000000"/>
+                </a:solidFill>
+                <a:latin typeface="Arial"/>
+                <a:ea typeface="Noto Sans CJK SC"/>
+              </a:rPr>
+              <a:t>Otra forma bastante común de conectar tu web en WordPress con tu CRM es crear un editor de perfil en tu web para que las propias usuarias puedan editar sus datos, sus preferencias y sus boletines de forma que ellas directamente nos den la información que luego vamos a usar.</a:t>
+            </a:r>
+            <a:endParaRPr b="0" lang="es-ES" sz="1300" spc="-1" strike="noStrike">
+              <a:solidFill>
+                <a:srgbClr val="000000"/>
+              </a:solidFill>
+              <a:latin typeface="Arial"/>
+              <a:ea typeface="Noto Sans CJK SC"/>
+            </a:endParaRPr>
+          </a:p>
+          <a:p>
+            <a:pPr>
+              <a:lnSpc>
+                <a:spcPct val="100000"/>
+              </a:lnSpc>
+              <a:spcBef>
+                <a:spcPts val="850"/>
+              </a:spcBef>
+              <a:spcAft>
+                <a:spcPts val="850"/>
+              </a:spcAft>
+            </a:pPr>
+            <a:r>
+              <a:rPr b="0" lang="es-ES" sz="1300" spc="-1" strike="noStrike">
+                <a:solidFill>
+                  <a:srgbClr val="000000"/>
+                </a:solidFill>
+                <a:latin typeface="Arial"/>
+                <a:ea typeface="Noto Sans CJK SC"/>
+              </a:rPr>
+              <a:t>Algunos ejemplos:</a:t>
+            </a:r>
+            <a:endParaRPr b="0" lang="es-ES" sz="1300" spc="-1" strike="noStrike">
+              <a:solidFill>
+                <a:srgbClr val="000000"/>
+              </a:solidFill>
+              <a:latin typeface="Arial"/>
+              <a:ea typeface="Noto Sans CJK SC"/>
+            </a:endParaRPr>
+          </a:p>
+          <a:p>
+            <a:pPr marL="432000" indent="-324000">
+              <a:lnSpc>
+                <a:spcPct val="100000"/>
+              </a:lnSpc>
+              <a:spcBef>
+                <a:spcPts val="340"/>
+              </a:spcBef>
+              <a:spcAft>
+                <a:spcPts val="142"/>
+              </a:spcAft>
+              <a:buClr>
+                <a:srgbClr val="000000"/>
+              </a:buClr>
+              <a:buSzPct val="45000"/>
+              <a:buFont typeface="Wingdings" charset="2"/>
+              <a:buChar char=""/>
+            </a:pPr>
+            <a:r>
+              <a:rPr b="0" lang="es-ES" sz="1300" spc="-1" strike="noStrike" u="sng">
+                <a:solidFill>
+                  <a:srgbClr val="0097a7"/>
+                </a:solidFill>
+                <a:uFillTx/>
+                <a:latin typeface="Arial"/>
+                <a:ea typeface="Noto Sans CJK SC"/>
+                <a:hlinkClick r:id="rId1"/>
+              </a:rPr>
+              <a:t>SPRI</a:t>
+            </a:r>
+            <a:endParaRPr b="0" lang="es-ES" sz="1300" spc="-1" strike="noStrike">
+              <a:solidFill>
+                <a:srgbClr val="000000"/>
+              </a:solidFill>
+              <a:latin typeface="Arial"/>
+              <a:ea typeface="Noto Sans CJK SC"/>
+            </a:endParaRPr>
+          </a:p>
+          <a:p>
+            <a:pPr marL="432000" indent="-324000">
+              <a:lnSpc>
+                <a:spcPct val="100000"/>
+              </a:lnSpc>
+              <a:spcBef>
+                <a:spcPts val="340"/>
+              </a:spcBef>
+              <a:spcAft>
+                <a:spcPts val="142"/>
+              </a:spcAft>
+              <a:buClr>
+                <a:srgbClr val="000000"/>
+              </a:buClr>
+              <a:buSzPct val="45000"/>
+              <a:buFont typeface="Wingdings" charset="2"/>
+              <a:buChar char=""/>
+            </a:pPr>
+            <a:r>
+              <a:rPr b="0" lang="es-ES" sz="1300" spc="-1" strike="noStrike" u="sng">
+                <a:solidFill>
+                  <a:srgbClr val="0097a7"/>
+                </a:solidFill>
+                <a:uFillTx/>
+                <a:latin typeface="Arial"/>
+                <a:ea typeface="Noto Sans CJK SC"/>
+                <a:hlinkClick r:id="rId2"/>
+              </a:rPr>
+              <a:t>AED</a:t>
+            </a:r>
+            <a:endParaRPr b="0" lang="es-ES" sz="1300" spc="-1" strike="noStrike">
+              <a:solidFill>
+                <a:srgbClr val="000000"/>
+              </a:solidFill>
+              <a:latin typeface="Arial"/>
+              <a:ea typeface="Noto Sans CJK SC"/>
+            </a:endParaRPr>
+          </a:p>
+        </p:txBody>
+      </p:sp>
+      <p:sp>
+        <p:nvSpPr>
+          <p:cNvPr id="87" name="PlaceHolder 11"/>
+          <p:cNvSpPr/>
+          <p:nvPr/>
+        </p:nvSpPr>
+        <p:spPr>
+          <a:xfrm>
+            <a:off x="180000" y="2718720"/>
+            <a:ext cx="8650440" cy="520920"/>
+          </a:xfrm>
+          <a:prstGeom prst="rect">
+            <a:avLst/>
+          </a:prstGeom>
+          <a:noFill/>
+          <a:ln w="0">
+            <a:noFill/>
+          </a:ln>
+        </p:spPr>
+        <p:style>
+          <a:lnRef idx="0"/>
+          <a:fillRef idx="0"/>
+          <a:effectRef idx="0"/>
+          <a:fontRef idx="minor"/>
+        </p:style>
+        <p:txBody>
+          <a:bodyPr lIns="90000" rIns="90000" tIns="91440" bIns="91440" anchor="t">
+            <a:normAutofit/>
+          </a:bodyPr>
+          <a:p>
+            <a:pPr algn="r">
+              <a:lnSpc>
+                <a:spcPct val="100000"/>
+              </a:lnSpc>
+              <a:spcBef>
+                <a:spcPts val="1191"/>
+              </a:spcBef>
+              <a:spcAft>
+                <a:spcPts val="992"/>
+              </a:spcAft>
+              <a:tabLst>
+                <a:tab algn="l" pos="0"/>
+              </a:tabLst>
+            </a:pPr>
+            <a:r>
+              <a:rPr b="1" lang="es-ES" sz="1500" spc="-1" strike="noStrike">
+                <a:solidFill>
+                  <a:srgbClr val="000000"/>
+                </a:solidFill>
+                <a:latin typeface="Arial"/>
+              </a:rPr>
+              <a:t>Consideraciones</a:t>
+            </a:r>
+            <a:r>
+              <a:rPr b="0" lang="es-ES" sz="1500" spc="-1" strike="noStrike">
+                <a:solidFill>
+                  <a:srgbClr val="000000"/>
+                </a:solidFill>
+                <a:latin typeface="Arial"/>
+              </a:rPr>
+              <a:t> Ƹ̵̡Ӝ̵̨̄Ʒ</a:t>
+            </a:r>
+            <a:endParaRPr b="0" lang="es-ES" sz="1500" spc="-1" strike="noStrike">
               <a:solidFill>
                 <a:srgbClr val="000000"/>
               </a:solidFill>
@@ -5766,18 +5676,18 @@
       </p:grpSpPr>
       <p:sp>
         <p:nvSpPr>
-          <p:cNvPr id="86" name="PlaceHolder 1"/>
+          <p:cNvPr id="88" name="PlaceHolder 1"/>
           <p:cNvSpPr>
             <a:spLocks noGrp="1"/>
           </p:cNvSpPr>
           <p:nvPr>
-            <p:ph type="title"/>
+            <p:ph/>
           </p:nvPr>
         </p:nvSpPr>
         <p:spPr>
           <a:xfrm>
-            <a:off x="380880" y="738720"/>
-            <a:ext cx="8518680" cy="520920"/>
+            <a:off x="311760" y="1461600"/>
+            <a:ext cx="5807880" cy="3116520"/>
           </a:xfrm>
           <a:prstGeom prst="rect">
             <a:avLst/>
@@ -5789,10 +5699,10 @@
         </p:spPr>
         <p:txBody>
           <a:bodyPr lIns="91440" rIns="91440" tIns="91440" bIns="91440" anchor="t">
-            <a:normAutofit/>
+            <a:normAutofit fontScale="81111"/>
           </a:bodyPr>
           <a:p>
-            <a:pPr indent="0" algn="r">
+            <a:pPr indent="0">
               <a:lnSpc>
                 <a:spcPct val="100000"/>
               </a:lnSpc>
@@ -5808,51 +5718,133 @@
               </a:tabLst>
             </a:pPr>
             <a:r>
-              <a:rPr b="1" lang="es-ES" sz="1800" spc="-1" strike="noStrike">
-                <a:solidFill>
-                  <a:srgbClr val="000000"/>
-                </a:solidFill>
-                <a:latin typeface="Arial"/>
-              </a:rPr>
-              <a:t>Mixto</a:t>
-            </a:r>
-            <a:r>
-              <a:rPr b="0" lang="es-ES" sz="1800" spc="-1" strike="noStrike">
-                <a:solidFill>
-                  <a:srgbClr val="000000"/>
-                </a:solidFill>
-                <a:latin typeface="Arial"/>
-              </a:rPr>
-              <a:t> </a:t>
-            </a:r>
-            <a:r>
-              <a:rPr b="0" lang="hi-IN" sz="1800" spc="-1" strike="noStrike">
-                <a:solidFill>
-                  <a:srgbClr val="000000"/>
-                </a:solidFill>
-                <a:latin typeface="Arial"/>
-              </a:rPr>
-              <a:t>இ</a:t>
-            </a:r>
-            <a:r>
-              <a:rPr b="0" lang="hi-IN" sz="1800" spc="-1" strike="noStrike">
-                <a:solidFill>
-                  <a:srgbClr val="000000"/>
-                </a:solidFill>
-                <a:latin typeface="Arial"/>
-              </a:rPr>
-              <a:t>ڿڰۣ-ڰۣ</a:t>
-            </a:r>
-            <a:r>
-              <a:rPr b="0" lang="es-ES" sz="1800" spc="-1" strike="noStrike">
-                <a:solidFill>
-                  <a:srgbClr val="000000"/>
-                </a:solidFill>
-                <a:latin typeface="Arial"/>
-              </a:rPr>
-              <a:t>—</a:t>
-            </a:r>
-            <a:endParaRPr b="0" lang="es-ES" sz="1800" spc="-1" strike="noStrike">
+              <a:rPr b="0" lang="es-ES" sz="1500" spc="-1" strike="noStrike">
+                <a:solidFill>
+                  <a:srgbClr val="000000"/>
+                </a:solidFill>
+                <a:latin typeface="Arial"/>
+              </a:rPr>
+              <a:t>Lo importante en esos desarrollos en </a:t>
+            </a:r>
+            <a:r>
+              <a:rPr b="1" lang="es-ES" sz="1500" spc="-1" strike="noStrike">
+                <a:solidFill>
+                  <a:srgbClr val="000000"/>
+                </a:solidFill>
+                <a:latin typeface="Arial"/>
+              </a:rPr>
+              <a:t>definir bien qué elementos va a tener el formulario y cómo van a poder rellenar</a:t>
+            </a:r>
+            <a:r>
+              <a:rPr b="0" lang="es-ES" sz="1500" spc="-1" strike="noStrike">
+                <a:solidFill>
+                  <a:srgbClr val="000000"/>
+                </a:solidFill>
+                <a:latin typeface="Arial"/>
+              </a:rPr>
+              <a:t>. Datos muy relevantes como pueden ser el tamaño de tu empresa, puede que no interese dejarse de mano de las clientes que editan su perfil.</a:t>
+            </a:r>
+            <a:endParaRPr b="0" lang="es-ES" sz="1500" spc="-1" strike="noStrike">
+              <a:solidFill>
+                <a:srgbClr val="000000"/>
+              </a:solidFill>
+              <a:latin typeface="Arial"/>
+            </a:endParaRPr>
+          </a:p>
+          <a:p>
+            <a:pPr indent="0">
+              <a:lnSpc>
+                <a:spcPct val="100000"/>
+              </a:lnSpc>
+              <a:spcBef>
+                <a:spcPts val="1191"/>
+              </a:spcBef>
+              <a:spcAft>
+                <a:spcPts val="992"/>
+              </a:spcAft>
+              <a:buNone/>
+              <a:tabLst>
+                <a:tab algn="l" pos="0"/>
+              </a:tabLst>
+            </a:pPr>
+            <a:r>
+              <a:rPr b="0" lang="es-ES" sz="1500" spc="-1" strike="noStrike">
+                <a:solidFill>
+                  <a:srgbClr val="000000"/>
+                </a:solidFill>
+                <a:latin typeface="Arial"/>
+              </a:rPr>
+              <a:t>La mejor opción es </a:t>
+            </a:r>
+            <a:r>
+              <a:rPr b="1" lang="es-ES" sz="1500" spc="-1" strike="noStrike">
+                <a:solidFill>
+                  <a:srgbClr val="000000"/>
+                </a:solidFill>
+                <a:latin typeface="Arial"/>
+              </a:rPr>
+              <a:t>cerrar lo más posible la entrada de datos</a:t>
+            </a:r>
+            <a:r>
+              <a:rPr b="0" lang="es-ES" sz="1500" spc="-1" strike="noStrike">
+                <a:solidFill>
+                  <a:srgbClr val="000000"/>
+                </a:solidFill>
+                <a:latin typeface="Arial"/>
+              </a:rPr>
+              <a:t>. Si podéis cerrar las opciones con desplegables, checkboxes, etc. mucho mejor que textos libres. Pensad que una ciudad puede escribirse de muchas formas: Galdakano, Galdacano, Galdakao, etc. </a:t>
+            </a:r>
+            <a:endParaRPr b="0" lang="es-ES" sz="1500" spc="-1" strike="noStrike">
+              <a:solidFill>
+                <a:srgbClr val="000000"/>
+              </a:solidFill>
+              <a:latin typeface="Arial"/>
+            </a:endParaRPr>
+          </a:p>
+          <a:p>
+            <a:pPr indent="0">
+              <a:lnSpc>
+                <a:spcPct val="100000"/>
+              </a:lnSpc>
+              <a:spcBef>
+                <a:spcPts val="1191"/>
+              </a:spcBef>
+              <a:spcAft>
+                <a:spcPts val="992"/>
+              </a:spcAft>
+              <a:buNone/>
+              <a:tabLst>
+                <a:tab algn="l" pos="0"/>
+              </a:tabLst>
+            </a:pPr>
+            <a:r>
+              <a:rPr b="0" lang="es-ES" sz="1500" spc="-1" strike="noStrike">
+                <a:solidFill>
+                  <a:srgbClr val="000000"/>
+                </a:solidFill>
+                <a:latin typeface="Arial"/>
+              </a:rPr>
+              <a:t>Os diría que </a:t>
+            </a:r>
+            <a:r>
+              <a:rPr b="1" lang="es-ES" sz="1500" spc="-1" strike="noStrike">
+                <a:solidFill>
+                  <a:srgbClr val="000000"/>
+                </a:solidFill>
+                <a:latin typeface="Arial"/>
+              </a:rPr>
+              <a:t>si tenéis dudas con ciertos campos, los duplicáis</a:t>
+            </a:r>
+            <a:r>
+              <a:rPr b="0" lang="es-ES" sz="1500" spc="-1" strike="noStrike">
+                <a:solidFill>
+                  <a:srgbClr val="000000"/>
+                </a:solidFill>
+                <a:latin typeface="Arial"/>
+              </a:rPr>
+              <a:t> y luego ver como funcionan las usuarias, tomáis una decisión de mantenerlo separado o fusionáis. Siguiendo el ejemplo anterior del tamaño de empresa, podemos tener el campo del CRM «tamaño_empresa» que usa marketing para sus segmentos y creamos otro para «tamaño_empresa_perfil» para el perfil de usuaria. </a:t>
+            </a:r>
+            <a:endParaRPr b="0" lang="es-ES" sz="1500" spc="-1" strike="noStrike">
               <a:solidFill>
                 <a:srgbClr val="000000"/>
               </a:solidFill>
@@ -5863,50 +5855,7 @@
       </p:sp>
       <p:sp>
         <p:nvSpPr>
-          <p:cNvPr id="87" name="PlaceHolder 2"/>
-          <p:cNvSpPr>
-            <a:spLocks noGrp="1"/>
-          </p:cNvSpPr>
-          <p:nvPr>
-            <p:ph/>
-          </p:nvPr>
-        </p:nvSpPr>
-        <p:spPr>
-          <a:xfrm>
-            <a:off x="311760" y="1461600"/>
-            <a:ext cx="8518680" cy="3116520"/>
-          </a:xfrm>
-          <a:prstGeom prst="rect">
-            <a:avLst/>
-          </a:prstGeom>
-          <a:noFill/>
-          <a:ln w="0">
-            <a:noFill/>
-          </a:ln>
-        </p:spPr>
-        <p:txBody>
-          <a:bodyPr lIns="91440" rIns="91440" tIns="91440" bIns="91440" anchor="t">
-            <a:normAutofit/>
-          </a:bodyPr>
-          <a:p>
-            <a:pPr indent="0">
-              <a:spcBef>
-                <a:spcPts val="1417"/>
-              </a:spcBef>
-              <a:buNone/>
-            </a:pPr>
-            <a:endParaRPr b="0" lang="es-ES" sz="1800" spc="-1" strike="noStrike">
-              <a:solidFill>
-                <a:srgbClr val="000000"/>
-              </a:solidFill>
-              <a:latin typeface="Arial"/>
-            </a:endParaRPr>
-          </a:p>
-        </p:txBody>
-      </p:sp>
-      <p:sp>
-        <p:nvSpPr>
-          <p:cNvPr id="88" name="PlaceHolder 3"/>
+          <p:cNvPr id="89" name="PlaceHolder 2"/>
           <p:cNvSpPr>
             <a:spLocks noGrp="1"/>
           </p:cNvSpPr>
@@ -5954,7 +5903,7 @@
                 </a:solidFill>
                 <a:latin typeface="Arial"/>
               </a:rPr>
-              <a:t>Formularios </a:t>
+              <a:t>Perfiles de usuarios </a:t>
             </a:r>
             <a:r>
               <a:rPr b="0" lang="es-ES" sz="1800" spc="-1" strike="noStrike">
@@ -5963,7 +5912,25 @@
                 </a:solidFill>
                 <a:latin typeface="Arial"/>
               </a:rPr>
-              <a:t>[̲̅$̲̅(̲̅ιοο̲̅)̲̅$̲̅]</a:t>
+              <a:t> ¦̵̱ ̵̱ ̵̱ ̵̱ ̵̱(̢ ̡͇̅└͇̅┘͇̅ (▤8</a:t>
+            </a:r>
+            <a:r>
+              <a:rPr b="0" lang="hi-IN" sz="1800" spc="-1" strike="noStrike">
+                <a:solidFill>
+                  <a:srgbClr val="174575"/>
+                </a:solidFill>
+                <a:latin typeface="Arial"/>
+              </a:rPr>
+              <a:t>כ</a:t>
+            </a:r>
+            <a:r>
+              <a:rPr b="0" lang="es-ES" sz="1800" spc="-1" strike="noStrike">
+                <a:solidFill>
+                  <a:srgbClr val="174575"/>
+                </a:solidFill>
+                <a:latin typeface="Arial"/>
+              </a:rPr>
+              <a:t>−◦</a:t>
             </a:r>
             <a:endParaRPr b="0" lang="es-ES" sz="1800" spc="-1" strike="noStrike">
               <a:solidFill>
@@ -5974,6 +5941,100 @@
           </a:p>
         </p:txBody>
       </p:sp>
+      <p:sp>
+        <p:nvSpPr>
+          <p:cNvPr id="90" name="PlaceHolder 8"/>
+          <p:cNvSpPr/>
+          <p:nvPr/>
+        </p:nvSpPr>
+        <p:spPr>
+          <a:xfrm>
+            <a:off x="180000" y="900000"/>
+            <a:ext cx="8650440" cy="520920"/>
+          </a:xfrm>
+          <a:prstGeom prst="rect">
+            <a:avLst/>
+          </a:prstGeom>
+          <a:noFill/>
+          <a:ln w="0">
+            <a:noFill/>
+          </a:ln>
+        </p:spPr>
+        <p:style>
+          <a:lnRef idx="0"/>
+          <a:fillRef idx="0"/>
+          <a:effectRef idx="0"/>
+          <a:fontRef idx="minor"/>
+        </p:style>
+        <p:txBody>
+          <a:bodyPr lIns="90000" rIns="90000" tIns="91440" bIns="91440" anchor="t">
+            <a:normAutofit/>
+          </a:bodyPr>
+          <a:p>
+            <a:pPr algn="r">
+              <a:lnSpc>
+                <a:spcPct val="100000"/>
+              </a:lnSpc>
+              <a:spcBef>
+                <a:spcPts val="1191"/>
+              </a:spcBef>
+              <a:spcAft>
+                <a:spcPts val="992"/>
+              </a:spcAft>
+              <a:tabLst>
+                <a:tab algn="l" pos="0"/>
+              </a:tabLst>
+            </a:pPr>
+            <a:r>
+              <a:rPr b="1" lang="es-ES" sz="1500" spc="-1" strike="noStrike">
+                <a:solidFill>
+                  <a:srgbClr val="000000"/>
+                </a:solidFill>
+                <a:latin typeface="Arial"/>
+              </a:rPr>
+              <a:t>¿Cómo tratar los datos?</a:t>
+            </a:r>
+            <a:r>
+              <a:rPr b="0" lang="es-ES" sz="1500" spc="-1" strike="noStrike">
+                <a:solidFill>
+                  <a:srgbClr val="000000"/>
+                </a:solidFill>
+                <a:latin typeface="Arial"/>
+              </a:rPr>
+              <a:t> d[ o_0 ]b</a:t>
+            </a:r>
+            <a:endParaRPr b="0" lang="es-ES" sz="1500" spc="-1" strike="noStrike">
+              <a:solidFill>
+                <a:srgbClr val="000000"/>
+              </a:solidFill>
+              <a:latin typeface="Arial"/>
+            </a:endParaRPr>
+          </a:p>
+        </p:txBody>
+      </p:sp>
+      <p:pic>
+        <p:nvPicPr>
+          <p:cNvPr id="91" name="" descr=""/>
+          <p:cNvPicPr/>
+          <p:nvPr/>
+        </p:nvPicPr>
+        <p:blipFill>
+          <a:blip r:embed="rId1"/>
+          <a:stretch/>
+        </p:blipFill>
+        <p:spPr>
+          <a:xfrm>
+            <a:off x="6120000" y="1394280"/>
+            <a:ext cx="2700000" cy="3339360"/>
+          </a:xfrm>
+          <a:prstGeom prst="rect">
+            <a:avLst/>
+          </a:prstGeom>
+          <a:ln w="0">
+            <a:noFill/>
+          </a:ln>
+        </p:spPr>
+      </p:pic>
     </p:spTree>
   </p:cSld>
   <mc:AlternateContent>
@@ -6006,7 +6067,7 @@
       </p:grpSpPr>
       <p:sp>
         <p:nvSpPr>
-          <p:cNvPr id="89" name="PlaceHolder 1"/>
+          <p:cNvPr id="92" name="PlaceHolder 1"/>
           <p:cNvSpPr>
             <a:spLocks noGrp="1"/>
           </p:cNvSpPr>
@@ -6016,8 +6077,8 @@
         </p:nvSpPr>
         <p:spPr>
           <a:xfrm>
-            <a:off x="360000" y="3240000"/>
-            <a:ext cx="8518680" cy="1259640"/>
+            <a:off x="311760" y="900000"/>
+            <a:ext cx="5987880" cy="3678120"/>
           </a:xfrm>
           <a:prstGeom prst="rect">
             <a:avLst/>
@@ -6029,92 +6090,177 @@
         </p:spPr>
         <p:txBody>
           <a:bodyPr lIns="91440" rIns="91440" tIns="91440" bIns="91440" anchor="t">
-            <a:normAutofit/>
+            <a:normAutofit fontScale="62222" lnSpcReduction="10000"/>
           </a:bodyPr>
           <a:p>
-            <a:pPr marL="432000" indent="-324000">
+            <a:pPr indent="0">
               <a:lnSpc>
                 <a:spcPct val="100000"/>
               </a:lnSpc>
               <a:spcBef>
-                <a:spcPts val="624"/>
+                <a:spcPts val="1191"/>
               </a:spcBef>
               <a:spcAft>
-                <a:spcPts val="425"/>
+                <a:spcPts val="992"/>
               </a:spcAft>
-              <a:buClr>
-                <a:srgbClr val="000000"/>
-              </a:buClr>
-              <a:buSzPct val="45000"/>
-              <a:buFont typeface="Wingdings" charset="2"/>
-              <a:buChar char=""/>
-            </a:pPr>
-            <a:r>
-              <a:rPr b="1" lang="es-ES" sz="1300" spc="-1" strike="noStrike">
-                <a:solidFill>
-                  <a:srgbClr val="000000"/>
-                </a:solidFill>
-                <a:latin typeface="Arial"/>
-                <a:ea typeface="Noto Sans CJK SC"/>
-              </a:rPr>
-              <a:t>No son desarrollos complicados</a:t>
-            </a:r>
-            <a:r>
-              <a:rPr b="0" lang="es-ES" sz="1300" spc="-1" strike="noStrike">
-                <a:solidFill>
-                  <a:srgbClr val="000000"/>
-                </a:solidFill>
-                <a:latin typeface="Arial"/>
-                <a:ea typeface="Noto Sans CJK SC"/>
-              </a:rPr>
-              <a:t>, son casi siempre tema de POST/GET de los datos y montarlos en un formulario. Se pueden complicar cuando metemos fotos o documentos como CV en PDF, por ejemplo.</a:t>
-            </a:r>
-            <a:endParaRPr b="0" lang="es-ES" sz="1300" spc="-1" strike="noStrike">
-              <a:solidFill>
-                <a:srgbClr val="000000"/>
-              </a:solidFill>
-              <a:latin typeface="Arial"/>
-            </a:endParaRPr>
-          </a:p>
-          <a:p>
-            <a:pPr marL="432000" indent="-324000">
+              <a:buNone/>
+              <a:tabLst>
+                <a:tab algn="l" pos="0"/>
+              </a:tabLst>
+            </a:pPr>
+            <a:r>
+              <a:rPr b="0" lang="es-ES" sz="1800" spc="-1" strike="noStrike">
+                <a:solidFill>
+                  <a:srgbClr val="000000"/>
+                </a:solidFill>
+                <a:latin typeface="Arial"/>
+              </a:rPr>
+              <a:t>Lo mismo que tu WordPress alimenta a tu CRM, habrá veces en que el CRM va a alimentar nuestra web. Este tipo de conexiones van a necesitar desarrollos propios y acceso a API. Las funcionalidades pueden muchas, aunque normalmente solo extraen información.</a:t>
+            </a:r>
+            <a:endParaRPr b="0" lang="es-ES" sz="1800" spc="-1" strike="noStrike">
+              <a:solidFill>
+                <a:srgbClr val="000000"/>
+              </a:solidFill>
+              <a:latin typeface="Arial"/>
+            </a:endParaRPr>
+          </a:p>
+          <a:p>
+            <a:pPr indent="0">
               <a:lnSpc>
                 <a:spcPct val="100000"/>
               </a:lnSpc>
               <a:spcBef>
-                <a:spcPts val="624"/>
+                <a:spcPts val="1191"/>
               </a:spcBef>
               <a:spcAft>
-                <a:spcPts val="425"/>
+                <a:spcPts val="992"/>
               </a:spcAft>
-              <a:buClr>
-                <a:srgbClr val="000000"/>
-              </a:buClr>
-              <a:buSzPct val="45000"/>
-              <a:buFont typeface="Wingdings" charset="2"/>
-              <a:buChar char=""/>
-            </a:pPr>
-            <a:r>
-              <a:rPr b="1" lang="es-ES" sz="1300" spc="-1" strike="noStrike">
-                <a:solidFill>
-                  <a:srgbClr val="000000"/>
-                </a:solidFill>
-                <a:latin typeface="Arial"/>
-                <a:ea typeface="Noto Sans CJK SC"/>
-              </a:rPr>
-              <a:t>No debemos almacenar contraseñas en nuestro CRM</a:t>
-            </a:r>
-            <a:r>
-              <a:rPr b="0" lang="es-ES" sz="1300" spc="-1" strike="noStrike">
-                <a:solidFill>
-                  <a:srgbClr val="000000"/>
-                </a:solidFill>
-                <a:latin typeface="Arial"/>
-                <a:ea typeface="Noto Sans CJK SC"/>
-              </a:rPr>
-              <a:t>, lo suyo es usar el login/registro de WordPress o generar algún tipo de «hash» temporal que se envíe al correo, así la gestión de seguridad la hace el correo.</a:t>
-            </a:r>
-            <a:endParaRPr b="0" lang="es-ES" sz="1300" spc="-1" strike="noStrike">
+              <a:buNone/>
+              <a:tabLst>
+                <a:tab algn="l" pos="0"/>
+              </a:tabLst>
+            </a:pPr>
+            <a:r>
+              <a:rPr b="1" lang="es-ES" sz="1800" spc="-1" strike="noStrike">
+                <a:solidFill>
+                  <a:srgbClr val="000000"/>
+                </a:solidFill>
+                <a:latin typeface="Arial"/>
+              </a:rPr>
+              <a:t>Caso práctico 1:</a:t>
+            </a:r>
+            <a:r>
+              <a:rPr b="0" lang="es-ES" sz="1800" spc="-1" strike="noStrike">
+                <a:solidFill>
+                  <a:srgbClr val="000000"/>
+                </a:solidFill>
+                <a:latin typeface="Arial"/>
+              </a:rPr>
+              <a:t> Tenemos una </a:t>
+            </a:r>
+            <a:r>
+              <a:rPr b="0" lang="es-ES" sz="1800" spc="-1" strike="noStrike" u="sng">
+                <a:solidFill>
+                  <a:srgbClr val="0097a7"/>
+                </a:solidFill>
+                <a:uFillTx/>
+                <a:latin typeface="Arial"/>
+                <a:hlinkClick r:id="rId1"/>
+              </a:rPr>
+              <a:t>asociación</a:t>
+            </a:r>
+            <a:r>
+              <a:rPr b="0" lang="es-ES" sz="1800" spc="-1" strike="noStrike">
+                <a:solidFill>
+                  <a:srgbClr val="000000"/>
+                </a:solidFill>
+                <a:latin typeface="Arial"/>
+              </a:rPr>
+              <a:t> que tiene etiquetada a todas sus socias. La web muestra las fichas de las asociadas con sus datos más importantes. Esa información se saca del CRM y cuando se modifica en el CRM se modifica en la web.</a:t>
+            </a:r>
+            <a:endParaRPr b="0" lang="es-ES" sz="1800" spc="-1" strike="noStrike">
+              <a:solidFill>
+                <a:srgbClr val="000000"/>
+              </a:solidFill>
+              <a:latin typeface="Arial"/>
+            </a:endParaRPr>
+          </a:p>
+          <a:p>
+            <a:pPr indent="0">
+              <a:lnSpc>
+                <a:spcPct val="100000"/>
+              </a:lnSpc>
+              <a:spcBef>
+                <a:spcPts val="1191"/>
+              </a:spcBef>
+              <a:spcAft>
+                <a:spcPts val="992"/>
+              </a:spcAft>
+              <a:buNone/>
+              <a:tabLst>
+                <a:tab algn="l" pos="0"/>
+              </a:tabLst>
+            </a:pPr>
+            <a:r>
+              <a:rPr b="1" lang="es-ES" sz="1800" spc="-1" strike="noStrike">
+                <a:solidFill>
+                  <a:srgbClr val="000000"/>
+                </a:solidFill>
+                <a:latin typeface="Arial"/>
+              </a:rPr>
+              <a:t>Caso práctico 2:</a:t>
+            </a:r>
+            <a:r>
+              <a:rPr b="0" lang="es-ES" sz="1800" spc="-1" strike="noStrike">
+                <a:solidFill>
+                  <a:srgbClr val="000000"/>
+                </a:solidFill>
+                <a:latin typeface="Arial"/>
+              </a:rPr>
+              <a:t> Se desarrolló un plugin que creaba un mini-sistema de contenido publicitario personalizado. Cada contacto tenía una serie de «LeadScorings» basados en sus intereses. En el admin se podían crear contenidos muy sencillos (titular, foto y texto) y asignarle un «LeadScoring» y un máximo y un mínimo. Si un contacto identificado con puntos en ese interés dentro de los parámetros establecidos, visitaba la web veía esos contenidos en determinadas partes de la web como el «sidebar» o el «footer». No eran muy intrusivos porque eran publicidad interna, pero lo interesante es que estaba bastante personalizada.</a:t>
+            </a:r>
+            <a:endParaRPr b="0" lang="es-ES" sz="1800" spc="-1" strike="noStrike">
+              <a:solidFill>
+                <a:srgbClr val="000000"/>
+              </a:solidFill>
+              <a:latin typeface="Arial"/>
+            </a:endParaRPr>
+          </a:p>
+          <a:p>
+            <a:pPr indent="0">
+              <a:lnSpc>
+                <a:spcPct val="100000"/>
+              </a:lnSpc>
+              <a:spcBef>
+                <a:spcPts val="1191"/>
+              </a:spcBef>
+              <a:spcAft>
+                <a:spcPts val="992"/>
+              </a:spcAft>
+              <a:buNone/>
+              <a:tabLst>
+                <a:tab algn="l" pos="0"/>
+              </a:tabLst>
+            </a:pPr>
+            <a:r>
+              <a:rPr b="1" lang="es-ES" sz="1800" spc="-1" strike="noStrike">
+                <a:solidFill>
+                  <a:srgbClr val="000000"/>
+                </a:solidFill>
+                <a:latin typeface="Arial"/>
+              </a:rPr>
+              <a:t>Consejo:</a:t>
+            </a:r>
+            <a:r>
+              <a:rPr b="0" lang="es-ES" sz="1800" spc="-1" strike="noStrike">
+                <a:solidFill>
+                  <a:srgbClr val="000000"/>
+                </a:solidFill>
+                <a:latin typeface="Arial"/>
+              </a:rPr>
+              <a:t> Si no es importante que los datos estén actualizados al minuto trata de cachearlos lo máximo posible. El listado de socios del caso práctico puede pedirse una vez al día y tirar de ese cacheo hasta el día siguiente </a:t>
+            </a:r>
+            <a:endParaRPr b="0" lang="es-ES" sz="1800" spc="-1" strike="noStrike">
               <a:solidFill>
                 <a:srgbClr val="000000"/>
               </a:solidFill>
@@ -6125,7 +6271,7 @@
       </p:sp>
       <p:sp>
         <p:nvSpPr>
-          <p:cNvPr id="90" name="PlaceHolder 2"/>
+          <p:cNvPr id="93" name="PlaceHolder 2"/>
           <p:cNvSpPr>
             <a:spLocks noGrp="1"/>
           </p:cNvSpPr>
@@ -6148,7 +6294,7 @@
         </p:spPr>
         <p:txBody>
           <a:bodyPr lIns="91440" rIns="91440" tIns="91440" bIns="91440" anchor="t">
-            <a:normAutofit/>
+            <a:normAutofit fontScale="81111"/>
           </a:bodyPr>
           <a:p>
             <a:pPr indent="0" algn="r">
@@ -6173,34 +6319,7 @@
                 </a:solidFill>
                 <a:latin typeface="Arial"/>
               </a:rPr>
-              <a:t>Perfiles de usuarios </a:t>
-            </a:r>
-            <a:r>
-              <a:rPr b="0" lang="es-ES" sz="1800" spc="-1" strike="noStrike">
-                <a:solidFill>
-                  <a:srgbClr val="174575"/>
-                </a:solidFill>
-                <a:latin typeface="Arial"/>
-              </a:rPr>
-              <a:t> ¦̵̱ ̵̱ ̵̱ ̵̱ ̵̱(̢ ̡͇̅└͇̅┘͇̅ (▤8</a:t>
-            </a:r>
-            <a:r>
-              <a:rPr b="0" lang="hi-IN" sz="1800" spc="-1" strike="noStrike">
-                <a:solidFill>
-                  <a:srgbClr val="174575"/>
-                </a:solidFill>
-                <a:latin typeface="Arial"/>
-              </a:rPr>
-              <a:t>כ</a:t>
-            </a:r>
-            <a:r>
-              <a:rPr b="0" lang="es-ES" sz="1800" spc="-1" strike="noStrike">
-                <a:solidFill>
-                  <a:srgbClr val="174575"/>
-                </a:solidFill>
-                <a:latin typeface="Arial"/>
-              </a:rPr>
-              <a:t>−◦</a:t>
+              <a:t>Sacando información del CRM para mostrarlo en WordPress &lt;:3 )~~~</a:t>
             </a:r>
             <a:endParaRPr b="0" lang="es-ES" sz="1800" spc="-1" strike="noStrike">
               <a:solidFill>
@@ -6211,228 +6330,29 @@
           </a:p>
         </p:txBody>
       </p:sp>
-      <p:sp>
-        <p:nvSpPr>
-          <p:cNvPr id="91" name="PlaceHolder 10"/>
-          <p:cNvSpPr/>
+      <p:pic>
+        <p:nvPicPr>
+          <p:cNvPr id="94" name="" descr=""/>
+          <p:cNvPicPr/>
           <p:nvPr/>
-        </p:nvSpPr>
+        </p:nvPicPr>
+        <p:blipFill>
+          <a:blip r:embed="rId2"/>
+          <a:stretch/>
+        </p:blipFill>
         <p:spPr>
           <a:xfrm>
-            <a:off x="360000" y="1080000"/>
-            <a:ext cx="8639640" cy="1980000"/>
+            <a:off x="6438960" y="978480"/>
+            <a:ext cx="2422440" cy="3599640"/>
           </a:xfrm>
           <a:prstGeom prst="rect">
             <a:avLst/>
           </a:prstGeom>
-          <a:noFill/>
           <a:ln w="0">
             <a:noFill/>
           </a:ln>
         </p:spPr>
-        <p:style>
-          <a:lnRef idx="0"/>
-          <a:fillRef idx="0"/>
-          <a:effectRef idx="0"/>
-          <a:fontRef idx="minor"/>
-        </p:style>
-        <p:txBody>
-          <a:bodyPr lIns="90000" rIns="90000" tIns="91440" bIns="91440" anchor="t">
-            <a:normAutofit/>
-          </a:bodyPr>
-          <a:p>
-            <a:pPr>
-              <a:lnSpc>
-                <a:spcPct val="100000"/>
-              </a:lnSpc>
-            </a:pPr>
-            <a:r>
-              <a:rPr b="0" lang="es-ES" sz="1300" spc="-1" strike="noStrike">
-                <a:solidFill>
-                  <a:srgbClr val="000000"/>
-                </a:solidFill>
-                <a:latin typeface="Arial"/>
-                <a:ea typeface="Noto Sans CJK SC"/>
-              </a:rPr>
-              <a:t>Otra forma bastante común de conectar tu web en WordPress con tu CRM es crear un editor de perfil en tu web para que las propias usuarias puedan editar sus datos, sus preferencias y sus boletines de forma que ellas directamente nos den la información que luego vamos a usar.</a:t>
-            </a:r>
-            <a:endParaRPr b="0" lang="es-ES" sz="1300" spc="-1" strike="noStrike">
-              <a:solidFill>
-                <a:srgbClr val="000000"/>
-              </a:solidFill>
-              <a:latin typeface="Arial"/>
-            </a:endParaRPr>
-          </a:p>
-          <a:p>
-            <a:pPr>
-              <a:lnSpc>
-                <a:spcPct val="100000"/>
-              </a:lnSpc>
-            </a:pPr>
-            <a:r>
-              <a:rPr b="1" lang="es-ES" sz="1300" spc="-1" strike="noStrike">
-                <a:solidFill>
-                  <a:srgbClr val="000000"/>
-                </a:solidFill>
-                <a:latin typeface="Arial"/>
-                <a:ea typeface="Noto Sans CJK SC"/>
-              </a:rPr>
-              <a:t>Algunos ejemplos:</a:t>
-            </a:r>
-            <a:endParaRPr b="0" lang="es-ES" sz="1300" spc="-1" strike="noStrike">
-              <a:solidFill>
-                <a:srgbClr val="000000"/>
-              </a:solidFill>
-              <a:latin typeface="Arial"/>
-            </a:endParaRPr>
-          </a:p>
-          <a:p>
-            <a:pPr marL="432000" indent="-324000">
-              <a:lnSpc>
-                <a:spcPct val="100000"/>
-              </a:lnSpc>
-              <a:spcBef>
-                <a:spcPts val="624"/>
-              </a:spcBef>
-              <a:spcAft>
-                <a:spcPts val="425"/>
-              </a:spcAft>
-              <a:buClr>
-                <a:srgbClr val="000000"/>
-              </a:buClr>
-              <a:buSzPct val="45000"/>
-              <a:buFont typeface="Wingdings" charset="2"/>
-              <a:buChar char=""/>
-            </a:pPr>
-            <a:r>
-              <a:rPr b="0" lang="es-ES" sz="1300" spc="-1" strike="noStrike" u="sng">
-                <a:solidFill>
-                  <a:srgbClr val="0097a7"/>
-                </a:solidFill>
-                <a:uFillTx/>
-                <a:latin typeface="Arial"/>
-                <a:ea typeface="Noto Sans CJK SC"/>
-                <a:hlinkClick r:id="rId1"/>
-              </a:rPr>
-              <a:t>SPRI</a:t>
-            </a:r>
-            <a:endParaRPr b="0" lang="es-ES" sz="1300" spc="-1" strike="noStrike">
-              <a:solidFill>
-                <a:srgbClr val="000000"/>
-              </a:solidFill>
-              <a:latin typeface="Arial"/>
-            </a:endParaRPr>
-          </a:p>
-          <a:p>
-            <a:pPr marL="432000" indent="-324000">
-              <a:lnSpc>
-                <a:spcPct val="100000"/>
-              </a:lnSpc>
-              <a:spcBef>
-                <a:spcPts val="624"/>
-              </a:spcBef>
-              <a:spcAft>
-                <a:spcPts val="425"/>
-              </a:spcAft>
-              <a:buClr>
-                <a:srgbClr val="000000"/>
-              </a:buClr>
-              <a:buSzPct val="45000"/>
-              <a:buFont typeface="Wingdings" charset="2"/>
-              <a:buChar char=""/>
-            </a:pPr>
-            <a:r>
-              <a:rPr b="0" lang="es-ES" sz="1300" spc="-1" strike="noStrike" u="sng">
-                <a:solidFill>
-                  <a:srgbClr val="0097a7"/>
-                </a:solidFill>
-                <a:uFillTx/>
-                <a:latin typeface="Arial"/>
-                <a:ea typeface="Noto Sans CJK SC"/>
-                <a:hlinkClick r:id="rId2"/>
-              </a:rPr>
-              <a:t>AED</a:t>
-            </a:r>
-            <a:endParaRPr b="0" lang="es-ES" sz="1300" spc="-1" strike="noStrike">
-              <a:solidFill>
-                <a:srgbClr val="000000"/>
-              </a:solidFill>
-              <a:latin typeface="Arial"/>
-            </a:endParaRPr>
-          </a:p>
-        </p:txBody>
-      </p:sp>
-      <p:sp>
-        <p:nvSpPr>
-          <p:cNvPr id="92" name="PlaceHolder 11"/>
-          <p:cNvSpPr/>
-          <p:nvPr/>
-        </p:nvSpPr>
-        <p:spPr>
-          <a:xfrm>
-            <a:off x="180000" y="2718720"/>
-            <a:ext cx="8650440" cy="520920"/>
-          </a:xfrm>
-          <a:prstGeom prst="rect">
-            <a:avLst/>
-          </a:prstGeom>
-          <a:noFill/>
-          <a:ln w="0">
-            <a:noFill/>
-          </a:ln>
-        </p:spPr>
-        <p:style>
-          <a:lnRef idx="0"/>
-          <a:fillRef idx="0"/>
-          <a:effectRef idx="0"/>
-          <a:fontRef idx="minor"/>
-        </p:style>
-        <p:txBody>
-          <a:bodyPr lIns="90000" rIns="90000" tIns="91440" bIns="91440" anchor="t">
-            <a:normAutofit/>
-          </a:bodyPr>
-          <a:p>
-            <a:pPr algn="r">
-              <a:lnSpc>
-                <a:spcPct val="100000"/>
-              </a:lnSpc>
-              <a:spcBef>
-                <a:spcPts val="1191"/>
-              </a:spcBef>
-              <a:spcAft>
-                <a:spcPts val="992"/>
-              </a:spcAft>
-              <a:tabLst>
-                <a:tab algn="l" pos="0"/>
-              </a:tabLst>
-            </a:pPr>
-            <a:r>
-              <a:rPr b="1" lang="es-ES" sz="1500" spc="-1" strike="noStrike">
-                <a:solidFill>
-                  <a:srgbClr val="000000"/>
-                </a:solidFill>
-                <a:latin typeface="Arial"/>
-              </a:rPr>
-              <a:t>¿Cómo tratar los datos?</a:t>
-            </a:r>
-            <a:r>
-              <a:rPr b="0" lang="es-ES" sz="1500" spc="-1" strike="noStrike">
-                <a:solidFill>
-                  <a:srgbClr val="000000"/>
-                </a:solidFill>
-                <a:latin typeface="Arial"/>
-              </a:rPr>
-              <a:t> Ƹ̵̡Ӝ̵̨̄Ʒ</a:t>
-            </a:r>
-            <a:endParaRPr b="0" lang="es-ES" sz="1500" spc="-1" strike="noStrike">
-              <a:solidFill>
-                <a:srgbClr val="000000"/>
-              </a:solidFill>
-              <a:latin typeface="Arial"/>
-            </a:endParaRPr>
-          </a:p>
-        </p:txBody>
-      </p:sp>
+      </p:pic>
     </p:spTree>
   </p:cSld>
   <mc:AlternateContent>
@@ -6465,186 +6385,7 @@
       </p:grpSpPr>
       <p:sp>
         <p:nvSpPr>
-          <p:cNvPr id="93" name="PlaceHolder 1"/>
-          <p:cNvSpPr>
-            <a:spLocks noGrp="1"/>
-          </p:cNvSpPr>
-          <p:nvPr>
-            <p:ph/>
-          </p:nvPr>
-        </p:nvSpPr>
-        <p:spPr>
-          <a:xfrm>
-            <a:off x="311760" y="1461600"/>
-            <a:ext cx="5807880" cy="3116520"/>
-          </a:xfrm>
-          <a:prstGeom prst="rect">
-            <a:avLst/>
-          </a:prstGeom>
-          <a:noFill/>
-          <a:ln w="0">
-            <a:noFill/>
-          </a:ln>
-        </p:spPr>
-        <p:txBody>
-          <a:bodyPr lIns="91440" rIns="91440" tIns="91440" bIns="91440" anchor="t">
-            <a:normAutofit fontScale="81111"/>
-          </a:bodyPr>
-          <a:p>
-            <a:pPr indent="0">
-              <a:lnSpc>
-                <a:spcPct val="100000"/>
-              </a:lnSpc>
-              <a:spcBef>
-                <a:spcPts val="1191"/>
-              </a:spcBef>
-              <a:spcAft>
-                <a:spcPts val="992"/>
-              </a:spcAft>
-              <a:buNone/>
-              <a:tabLst>
-                <a:tab algn="l" pos="0"/>
-              </a:tabLst>
-            </a:pPr>
-            <a:r>
-              <a:rPr b="0" lang="es-ES" sz="1500" spc="-1" strike="noStrike">
-                <a:solidFill>
-                  <a:srgbClr val="000000"/>
-                </a:solidFill>
-                <a:latin typeface="Arial"/>
-              </a:rPr>
-              <a:t>Lo importante en esos desarrollos en </a:t>
-            </a:r>
-            <a:r>
-              <a:rPr b="1" lang="es-ES" sz="1500" spc="-1" strike="noStrike">
-                <a:solidFill>
-                  <a:srgbClr val="000000"/>
-                </a:solidFill>
-                <a:latin typeface="Arial"/>
-              </a:rPr>
-              <a:t>definir bien qué elementos va a tener el formulario y cómo van a poder rellenar</a:t>
-            </a:r>
-            <a:r>
-              <a:rPr b="0" lang="es-ES" sz="1500" spc="-1" strike="noStrike">
-                <a:solidFill>
-                  <a:srgbClr val="000000"/>
-                </a:solidFill>
-                <a:latin typeface="Arial"/>
-              </a:rPr>
-              <a:t>. Datos muy relevantes como pueden ser el tamaño de tu empresa, puede que no interese dejarse de mano de las clientes que editan su perfil.</a:t>
-            </a:r>
-            <a:endParaRPr b="0" lang="es-ES" sz="1500" spc="-1" strike="noStrike">
-              <a:solidFill>
-                <a:srgbClr val="000000"/>
-              </a:solidFill>
-              <a:latin typeface="Arial"/>
-            </a:endParaRPr>
-          </a:p>
-          <a:p>
-            <a:pPr indent="0">
-              <a:lnSpc>
-                <a:spcPct val="100000"/>
-              </a:lnSpc>
-              <a:spcBef>
-                <a:spcPts val="1191"/>
-              </a:spcBef>
-              <a:spcAft>
-                <a:spcPts val="992"/>
-              </a:spcAft>
-              <a:buNone/>
-              <a:tabLst>
-                <a:tab algn="l" pos="0"/>
-              </a:tabLst>
-            </a:pPr>
-            <a:r>
-              <a:rPr b="0" lang="es-ES" sz="1500" spc="-1" strike="noStrike">
-                <a:solidFill>
-                  <a:srgbClr val="000000"/>
-                </a:solidFill>
-                <a:latin typeface="Arial"/>
-              </a:rPr>
-              <a:t>La mejor opción es </a:t>
-            </a:r>
-            <a:r>
-              <a:rPr b="1" lang="es-ES" sz="1500" spc="-1" strike="noStrike">
-                <a:solidFill>
-                  <a:srgbClr val="000000"/>
-                </a:solidFill>
-                <a:latin typeface="Arial"/>
-              </a:rPr>
-              <a:t>cerrar lo más posible la entrada de datos</a:t>
-            </a:r>
-            <a:r>
-              <a:rPr b="0" lang="es-ES" sz="1500" spc="-1" strike="noStrike">
-                <a:solidFill>
-                  <a:srgbClr val="000000"/>
-                </a:solidFill>
-                <a:latin typeface="Arial"/>
-              </a:rPr>
-              <a:t>. Si podéis cerrar las opciones con desplegables, checkboxes, etc. mucho mejor que textos libres. Pensad que una ciudad puede escribirse de muchas formas: Galdakano, Galdacano, Galdakao, etc. </a:t>
-            </a:r>
-            <a:endParaRPr b="0" lang="es-ES" sz="1500" spc="-1" strike="noStrike">
-              <a:solidFill>
-                <a:srgbClr val="000000"/>
-              </a:solidFill>
-              <a:latin typeface="Arial"/>
-            </a:endParaRPr>
-          </a:p>
-          <a:p>
-            <a:pPr indent="0">
-              <a:lnSpc>
-                <a:spcPct val="100000"/>
-              </a:lnSpc>
-              <a:spcBef>
-                <a:spcPts val="1191"/>
-              </a:spcBef>
-              <a:spcAft>
-                <a:spcPts val="992"/>
-              </a:spcAft>
-              <a:buNone/>
-              <a:tabLst>
-                <a:tab algn="l" pos="0"/>
-              </a:tabLst>
-            </a:pPr>
-            <a:r>
-              <a:rPr b="0" lang="es-ES" sz="1500" spc="-1" strike="noStrike">
-                <a:solidFill>
-                  <a:srgbClr val="000000"/>
-                </a:solidFill>
-                <a:latin typeface="Arial"/>
-              </a:rPr>
-              <a:t>Os diría que </a:t>
-            </a:r>
-            <a:r>
-              <a:rPr b="1" lang="es-ES" sz="1500" spc="-1" strike="noStrike">
-                <a:solidFill>
-                  <a:srgbClr val="000000"/>
-                </a:solidFill>
-                <a:latin typeface="Arial"/>
-              </a:rPr>
-              <a:t>si tenéis dudas con ciertos campos, los duplicáis</a:t>
-            </a:r>
-            <a:r>
-              <a:rPr b="0" lang="es-ES" sz="1500" spc="-1" strike="noStrike">
-                <a:solidFill>
-                  <a:srgbClr val="000000"/>
-                </a:solidFill>
-                <a:latin typeface="Arial"/>
-              </a:rPr>
-              <a:t> y luego ver como funcionan las usuarias, tomáis una decisión de mantenerlo separado o fusionáis. Siguiendo el ejemplo anterior del tamaño de empresa, podemos tener el campo del CRM «tamaño_empresa» que usa marketing para sus segmentos y creamos otro para «tamaño_empresa_perfil» para el perfil de usuaria. </a:t>
-            </a:r>
-            <a:endParaRPr b="0" lang="es-ES" sz="1500" spc="-1" strike="noStrike">
-              <a:solidFill>
-                <a:srgbClr val="000000"/>
-              </a:solidFill>
-              <a:latin typeface="Arial"/>
-            </a:endParaRPr>
-          </a:p>
-        </p:txBody>
-      </p:sp>
-      <p:sp>
-        <p:nvSpPr>
-          <p:cNvPr id="94" name="PlaceHolder 2"/>
+          <p:cNvPr id="95" name="PlaceHolder 1"/>
           <p:cNvSpPr>
             <a:spLocks noGrp="1"/>
           </p:cNvSpPr>
@@ -6654,8 +6395,8 @@
         </p:nvSpPr>
         <p:spPr>
           <a:xfrm>
-            <a:off x="2329560" y="294840"/>
-            <a:ext cx="6490440" cy="520920"/>
+            <a:off x="2520000" y="294120"/>
+            <a:ext cx="6310440" cy="520920"/>
           </a:xfrm>
           <a:prstGeom prst="rect">
             <a:avLst/>
@@ -6688,38 +6429,20 @@
             <a:r>
               <a:rPr b="1" lang="es-ES" sz="1800" spc="-1" strike="noStrike">
                 <a:solidFill>
-                  <a:srgbClr val="174575"/>
-                </a:solidFill>
-                <a:latin typeface="Arial"/>
-              </a:rPr>
-              <a:t>Perfiles de usuarios </a:t>
+                  <a:srgbClr val="000000"/>
+                </a:solidFill>
+                <a:latin typeface="Arial"/>
+              </a:rPr>
+              <a:t>Conexión directa a la API o crear un middleware</a:t>
             </a:r>
             <a:r>
               <a:rPr b="0" lang="es-ES" sz="1800" spc="-1" strike="noStrike">
                 <a:solidFill>
-                  <a:srgbClr val="174575"/>
-                </a:solidFill>
-                <a:latin typeface="Arial"/>
-              </a:rPr>
-              <a:t> ¦̵̱ ̵̱ ̵̱ ̵̱ ̵̱(̢ ̡͇̅└͇̅┘͇̅ (▤8</a:t>
-            </a:r>
-            <a:r>
-              <a:rPr b="0" lang="hi-IN" sz="1800" spc="-1" strike="noStrike">
-                <a:solidFill>
-                  <a:srgbClr val="174575"/>
-                </a:solidFill>
-                <a:latin typeface="Arial"/>
-              </a:rPr>
-              <a:t>כ</a:t>
-            </a:r>
-            <a:r>
-              <a:rPr b="0" lang="es-ES" sz="1800" spc="-1" strike="noStrike">
-                <a:solidFill>
-                  <a:srgbClr val="174575"/>
-                </a:solidFill>
-                <a:latin typeface="Arial"/>
-              </a:rPr>
-              <a:t>−◦</a:t>
+                  <a:srgbClr val="000000"/>
+                </a:solidFill>
+                <a:latin typeface="Arial"/>
+              </a:rPr>
+              <a:t> c[_]</a:t>
             </a:r>
             <a:endParaRPr b="0" lang="es-ES" sz="1800" spc="-1" strike="noStrike">
               <a:solidFill>
@@ -6732,14 +6455,18 @@
       </p:sp>
       <p:sp>
         <p:nvSpPr>
-          <p:cNvPr id="95" name="PlaceHolder 8"/>
-          <p:cNvSpPr/>
-          <p:nvPr/>
+          <p:cNvPr id="96" name="PlaceHolder 2"/>
+          <p:cNvSpPr>
+            <a:spLocks noGrp="1"/>
+          </p:cNvSpPr>
+          <p:nvPr>
+            <p:ph/>
+          </p:nvPr>
         </p:nvSpPr>
         <p:spPr>
           <a:xfrm>
-            <a:off x="180000" y="900000"/>
-            <a:ext cx="8650440" cy="520920"/>
+            <a:off x="311760" y="1461600"/>
+            <a:ext cx="8518680" cy="3116520"/>
           </a:xfrm>
           <a:prstGeom prst="rect">
             <a:avLst/>
@@ -6749,50 +6476,18 @@
             <a:noFill/>
           </a:ln>
         </p:spPr>
-        <p:style>
-          <a:lnRef idx="0"/>
-          <a:fillRef idx="0"/>
-          <a:effectRef idx="0"/>
-          <a:fontRef idx="minor"/>
-        </p:style>
         <p:txBody>
-          <a:bodyPr lIns="90000" rIns="90000" tIns="91440" bIns="91440" anchor="t">
+          <a:bodyPr lIns="91440" rIns="91440" tIns="91440" bIns="91440" anchor="t">
             <a:normAutofit/>
           </a:bodyPr>
           <a:p>
-            <a:pPr algn="r">
-              <a:lnSpc>
-                <a:spcPct val="100000"/>
-              </a:lnSpc>
-              <a:spcBef>
-                <a:spcPts val="1191"/>
-              </a:spcBef>
-              <a:spcAft>
-                <a:spcPts val="992"/>
-              </a:spcAft>
-              <a:tabLst>
-                <a:tab algn="l" pos="0"/>
-              </a:tabLst>
-            </a:pPr>
-            <a:r>
-              <a:rPr b="1" lang="es-ES" sz="1500" spc="-1" strike="noStrike">
-                <a:solidFill>
-                  <a:srgbClr val="000000"/>
-                </a:solidFill>
-                <a:latin typeface="Arial"/>
-              </a:rPr>
-              <a:t>¿Cómo tratar los datos?</a:t>
-            </a:r>
-            <a:r>
-              <a:rPr b="0" lang="es-ES" sz="1500" spc="-1" strike="noStrike">
-                <a:solidFill>
-                  <a:srgbClr val="000000"/>
-                </a:solidFill>
-                <a:latin typeface="Arial"/>
-              </a:rPr>
-              <a:t> d[ o_0 ]b</a:t>
-            </a:r>
-            <a:endParaRPr b="0" lang="es-ES" sz="1500" spc="-1" strike="noStrike">
+            <a:pPr indent="0">
+              <a:spcBef>
+                <a:spcPts val="1417"/>
+              </a:spcBef>
+              <a:buNone/>
+            </a:pPr>
+            <a:endParaRPr b="0" lang="es-ES" sz="1800" spc="-1" strike="noStrike">
               <a:solidFill>
                 <a:srgbClr val="000000"/>
               </a:solidFill>
@@ -6801,29 +6496,6 @@
           </a:p>
         </p:txBody>
       </p:sp>
-      <p:pic>
-        <p:nvPicPr>
-          <p:cNvPr id="96" name="" descr=""/>
-          <p:cNvPicPr/>
-          <p:nvPr/>
-        </p:nvPicPr>
-        <p:blipFill>
-          <a:blip r:embed="rId1"/>
-          <a:stretch/>
-        </p:blipFill>
-        <p:spPr>
-          <a:xfrm>
-            <a:off x="6120000" y="1394280"/>
-            <a:ext cx="2700000" cy="3339360"/>
-          </a:xfrm>
-          <a:prstGeom prst="rect">
-            <a:avLst/>
-          </a:prstGeom>
-          <a:ln w="0">
-            <a:noFill/>
-          </a:ln>
-        </p:spPr>
-      </p:pic>
     </p:spTree>
   </p:cSld>
   <mc:AlternateContent>
@@ -6861,216 +6533,12 @@
             <a:spLocks noGrp="1"/>
           </p:cNvSpPr>
           <p:nvPr>
-            <p:ph/>
-          </p:nvPr>
-        </p:nvSpPr>
-        <p:spPr>
-          <a:xfrm>
-            <a:off x="311760" y="900000"/>
-            <a:ext cx="5987880" cy="3678120"/>
-          </a:xfrm>
-          <a:prstGeom prst="rect">
-            <a:avLst/>
-          </a:prstGeom>
-          <a:noFill/>
-          <a:ln w="0">
-            <a:noFill/>
-          </a:ln>
-        </p:spPr>
-        <p:txBody>
-          <a:bodyPr lIns="91440" rIns="91440" tIns="91440" bIns="91440" anchor="t">
-            <a:normAutofit fontScale="62222" lnSpcReduction="10000"/>
-          </a:bodyPr>
-          <a:p>
-            <a:pPr indent="0">
-              <a:lnSpc>
-                <a:spcPct val="100000"/>
-              </a:lnSpc>
-              <a:spcBef>
-                <a:spcPts val="1191"/>
-              </a:spcBef>
-              <a:spcAft>
-                <a:spcPts val="992"/>
-              </a:spcAft>
-              <a:buNone/>
-              <a:tabLst>
-                <a:tab algn="l" pos="0"/>
-              </a:tabLst>
-            </a:pPr>
-            <a:r>
-              <a:rPr b="0" lang="es-ES" sz="1800" spc="-1" strike="noStrike">
-                <a:solidFill>
-                  <a:srgbClr val="000000"/>
-                </a:solidFill>
-                <a:latin typeface="Arial"/>
-              </a:rPr>
-              <a:t>Lo mismo que tu WordPress alimenta a tu CRM, habrá veces en que el CRM va a alimentar nuestra web. Este tipo de conexiones van a necesitar desarrollos propios y acceso a API. Las funcionalidades pueden muchas, aunque normalmente solo extraen información.</a:t>
-            </a:r>
-            <a:endParaRPr b="0" lang="es-ES" sz="1800" spc="-1" strike="noStrike">
-              <a:solidFill>
-                <a:srgbClr val="000000"/>
-              </a:solidFill>
-              <a:latin typeface="Arial"/>
-            </a:endParaRPr>
-          </a:p>
-          <a:p>
-            <a:pPr indent="0">
-              <a:lnSpc>
-                <a:spcPct val="100000"/>
-              </a:lnSpc>
-              <a:spcBef>
-                <a:spcPts val="1191"/>
-              </a:spcBef>
-              <a:spcAft>
-                <a:spcPts val="992"/>
-              </a:spcAft>
-              <a:buNone/>
-              <a:tabLst>
-                <a:tab algn="l" pos="0"/>
-              </a:tabLst>
-            </a:pPr>
-            <a:r>
-              <a:rPr b="1" lang="es-ES" sz="1800" spc="-1" strike="noStrike">
-                <a:solidFill>
-                  <a:srgbClr val="000000"/>
-                </a:solidFill>
-                <a:latin typeface="Arial"/>
-              </a:rPr>
-              <a:t>Caso práctico 1:</a:t>
-            </a:r>
-            <a:r>
-              <a:rPr b="0" lang="es-ES" sz="1800" spc="-1" strike="noStrike">
-                <a:solidFill>
-                  <a:srgbClr val="000000"/>
-                </a:solidFill>
-                <a:latin typeface="Arial"/>
-              </a:rPr>
-              <a:t> Tenemos una </a:t>
-            </a:r>
-            <a:r>
-              <a:rPr b="0" lang="es-ES" sz="1800" spc="-1" strike="noStrike" u="sng">
-                <a:solidFill>
-                  <a:srgbClr val="0097a7"/>
-                </a:solidFill>
-                <a:uFillTx/>
-                <a:latin typeface="Arial"/>
-                <a:hlinkClick r:id="rId1"/>
-              </a:rPr>
-              <a:t>asociación</a:t>
-            </a:r>
-            <a:r>
-              <a:rPr b="0" lang="es-ES" sz="1800" spc="-1" strike="noStrike">
-                <a:solidFill>
-                  <a:srgbClr val="000000"/>
-                </a:solidFill>
-                <a:latin typeface="Arial"/>
-              </a:rPr>
-              <a:t> que tiene etiquetada a todas sus socias. La web muestra las fichas de las asociadas con sus datos más importantes. Esa información se saca del CRM y cuando se modifica en el CRM se modifica en la web.</a:t>
-            </a:r>
-            <a:endParaRPr b="0" lang="es-ES" sz="1800" spc="-1" strike="noStrike">
-              <a:solidFill>
-                <a:srgbClr val="000000"/>
-              </a:solidFill>
-              <a:latin typeface="Arial"/>
-            </a:endParaRPr>
-          </a:p>
-          <a:p>
-            <a:pPr indent="0">
-              <a:lnSpc>
-                <a:spcPct val="100000"/>
-              </a:lnSpc>
-              <a:spcBef>
-                <a:spcPts val="1191"/>
-              </a:spcBef>
-              <a:spcAft>
-                <a:spcPts val="992"/>
-              </a:spcAft>
-              <a:buNone/>
-              <a:tabLst>
-                <a:tab algn="l" pos="0"/>
-              </a:tabLst>
-            </a:pPr>
-            <a:r>
-              <a:rPr b="1" lang="es-ES" sz="1800" spc="-1" strike="noStrike">
-                <a:solidFill>
-                  <a:srgbClr val="000000"/>
-                </a:solidFill>
-                <a:latin typeface="Arial"/>
-              </a:rPr>
-              <a:t>Caso práctico 2:</a:t>
-            </a:r>
-            <a:r>
-              <a:rPr b="0" lang="es-ES" sz="1800" spc="-1" strike="noStrike">
-                <a:solidFill>
-                  <a:srgbClr val="000000"/>
-                </a:solidFill>
-                <a:latin typeface="Arial"/>
-              </a:rPr>
-              <a:t> Se desarrolló un plugin que creaba un mini-sistema de contenido publicitario personalizado. Cada contacto tenía una serie de «LeadScorings» basados en sus intereses. En el admin se podían crear contenidos muy sencillos (titular, foto y texto) y asignarle un «LeadScoring» y un máximo y un mínimo. Si un contacto identificado con puntos en ese interés dentro de los parámetros establecidos, visitaba la web veía esos contenidos en determinadas partes de la web como el «sidebar» o el «footer». No eran muy intrusivos porque eran publicidad interna, pero lo interesante es que estaba bastante personalizada.</a:t>
-            </a:r>
-            <a:endParaRPr b="0" lang="es-ES" sz="1800" spc="-1" strike="noStrike">
-              <a:solidFill>
-                <a:srgbClr val="000000"/>
-              </a:solidFill>
-              <a:latin typeface="Arial"/>
-            </a:endParaRPr>
-          </a:p>
-          <a:p>
-            <a:pPr indent="0">
-              <a:lnSpc>
-                <a:spcPct val="100000"/>
-              </a:lnSpc>
-              <a:spcBef>
-                <a:spcPts val="1191"/>
-              </a:spcBef>
-              <a:spcAft>
-                <a:spcPts val="992"/>
-              </a:spcAft>
-              <a:buNone/>
-              <a:tabLst>
-                <a:tab algn="l" pos="0"/>
-              </a:tabLst>
-            </a:pPr>
-            <a:r>
-              <a:rPr b="1" lang="es-ES" sz="1800" spc="-1" strike="noStrike">
-                <a:solidFill>
-                  <a:srgbClr val="000000"/>
-                </a:solidFill>
-                <a:latin typeface="Arial"/>
-              </a:rPr>
-              <a:t>Consejo:</a:t>
-            </a:r>
-            <a:r>
-              <a:rPr b="0" lang="es-ES" sz="1800" spc="-1" strike="noStrike">
-                <a:solidFill>
-                  <a:srgbClr val="000000"/>
-                </a:solidFill>
-                <a:latin typeface="Arial"/>
-              </a:rPr>
-              <a:t> Si no es importante que los datos estén actualizados al minuto trata de cachearlos lo máximo posible. El listado de socios del caso práctico puede pedirse una vez al día y tirar de ese cacheo hasta el día siguiente </a:t>
-            </a:r>
-            <a:endParaRPr b="0" lang="es-ES" sz="1800" spc="-1" strike="noStrike">
-              <a:solidFill>
-                <a:srgbClr val="000000"/>
-              </a:solidFill>
-              <a:latin typeface="Arial"/>
-            </a:endParaRPr>
-          </a:p>
-        </p:txBody>
-      </p:sp>
-      <p:sp>
-        <p:nvSpPr>
-          <p:cNvPr id="98" name="PlaceHolder 2"/>
-          <p:cNvSpPr>
-            <a:spLocks noGrp="1"/>
-          </p:cNvSpPr>
-          <p:nvPr>
             <p:ph type="title"/>
           </p:nvPr>
         </p:nvSpPr>
         <p:spPr>
           <a:xfrm>
-            <a:off x="2329560" y="294840"/>
+            <a:off x="2340000" y="198360"/>
             <a:ext cx="6490440" cy="520920"/>
           </a:xfrm>
           <a:prstGeom prst="rect">
@@ -7083,19 +6551,13 @@
         </p:spPr>
         <p:txBody>
           <a:bodyPr lIns="91440" rIns="91440" tIns="91440" bIns="91440" anchor="t">
-            <a:normAutofit fontScale="81111"/>
+            <a:normAutofit/>
           </a:bodyPr>
           <a:p>
             <a:pPr indent="0" algn="r">
               <a:lnSpc>
                 <a:spcPct val="100000"/>
               </a:lnSpc>
-              <a:spcBef>
-                <a:spcPts val="1191"/>
-              </a:spcBef>
-              <a:spcAft>
-                <a:spcPts val="992"/>
-              </a:spcAft>
               <a:buNone/>
               <a:tabLst>
                 <a:tab algn="l" pos="0"/>
@@ -7108,7 +6570,16 @@
                 </a:solidFill>
                 <a:latin typeface="Arial"/>
               </a:rPr>
-              <a:t>Sacando información del CRM para mostrarlo en WordPress &lt;:3 )~~~</a:t>
+              <a:t>Consejos</a:t>
+            </a:r>
+            <a:r>
+              <a:rPr b="0" lang="es-ES" sz="1800" spc="-1" strike="noStrike">
+                <a:solidFill>
+                  <a:srgbClr val="174575"/>
+                </a:solidFill>
+                <a:latin typeface="Arial"/>
+              </a:rPr>
+              <a:t>❚█══█❚</a:t>
             </a:r>
             <a:endParaRPr b="0" lang="es-ES" sz="1800" spc="-1" strike="noStrike">
               <a:solidFill>
@@ -7119,29 +6590,255 @@
           </a:p>
         </p:txBody>
       </p:sp>
-      <p:pic>
-        <p:nvPicPr>
-          <p:cNvPr id="99" name="" descr=""/>
-          <p:cNvPicPr/>
-          <p:nvPr/>
-        </p:nvPicPr>
-        <p:blipFill>
-          <a:blip r:embed="rId2"/>
-          <a:stretch/>
-        </p:blipFill>
+      <p:sp>
+        <p:nvSpPr>
+          <p:cNvPr id="98" name="PlaceHolder 2"/>
+          <p:cNvSpPr>
+            <a:spLocks noGrp="1"/>
+          </p:cNvSpPr>
+          <p:nvPr>
+            <p:ph/>
+          </p:nvPr>
+        </p:nvSpPr>
         <p:spPr>
           <a:xfrm>
-            <a:off x="6438960" y="978480"/>
-            <a:ext cx="2422440" cy="3599640"/>
+            <a:off x="311760" y="900000"/>
+            <a:ext cx="8518680" cy="3678120"/>
           </a:xfrm>
           <a:prstGeom prst="rect">
             <a:avLst/>
           </a:prstGeom>
+          <a:noFill/>
           <a:ln w="0">
             <a:noFill/>
           </a:ln>
         </p:spPr>
-      </p:pic>
+        <p:txBody>
+          <a:bodyPr lIns="91440" rIns="91440" tIns="91440" bIns="91440" anchor="t">
+            <a:normAutofit/>
+          </a:bodyPr>
+          <a:p>
+            <a:pPr marL="432000" indent="-324000">
+              <a:lnSpc>
+                <a:spcPct val="100000"/>
+              </a:lnSpc>
+              <a:spcBef>
+                <a:spcPts val="624"/>
+              </a:spcBef>
+              <a:spcAft>
+                <a:spcPts val="425"/>
+              </a:spcAft>
+              <a:buClr>
+                <a:srgbClr val="000000"/>
+              </a:buClr>
+              <a:buSzPct val="45000"/>
+              <a:buFont typeface="Wingdings" charset="2"/>
+              <a:buChar char=""/>
+            </a:pPr>
+            <a:r>
+              <a:rPr b="1" lang="es-ES" sz="1200" spc="-1" strike="noStrike">
+                <a:solidFill>
+                  <a:srgbClr val="000000"/>
+                </a:solidFill>
+                <a:latin typeface="Arial"/>
+                <a:ea typeface="Noto Sans CJK SC"/>
+              </a:rPr>
+              <a:t>Cread un campo de fecha de última modificación.</a:t>
+            </a:r>
+            <a:r>
+              <a:rPr b="0" lang="es-ES" sz="1200" spc="-1" strike="noStrike">
+                <a:solidFill>
+                  <a:srgbClr val="000000"/>
+                </a:solidFill>
+                <a:latin typeface="Arial"/>
+                <a:ea typeface="Noto Sans CJK SC"/>
+              </a:rPr>
+              <a:t> Los CRM suelen guardar está información, pero no discriminan entre conexiones por API y directamente por web. Con este campo personalizado tendréis control de qué contactos habéis tocado desde WordPress y cuáles han sido tocados de otras formas.</a:t>
+            </a:r>
+            <a:endParaRPr b="0" lang="es-ES" sz="1200" spc="-1" strike="noStrike">
+              <a:solidFill>
+                <a:srgbClr val="000000"/>
+              </a:solidFill>
+              <a:latin typeface="Arial"/>
+            </a:endParaRPr>
+          </a:p>
+          <a:p>
+            <a:pPr marL="432000" indent="-324000">
+              <a:lnSpc>
+                <a:spcPct val="100000"/>
+              </a:lnSpc>
+              <a:spcBef>
+                <a:spcPts val="624"/>
+              </a:spcBef>
+              <a:spcAft>
+                <a:spcPts val="425"/>
+              </a:spcAft>
+              <a:buClr>
+                <a:srgbClr val="000000"/>
+              </a:buClr>
+              <a:buSzPct val="45000"/>
+              <a:buFont typeface="Wingdings" charset="2"/>
+              <a:buChar char=""/>
+            </a:pPr>
+            <a:r>
+              <a:rPr b="1" lang="es-ES" sz="1200" spc="-1" strike="noStrike">
+                <a:solidFill>
+                  <a:srgbClr val="000000"/>
+                </a:solidFill>
+                <a:latin typeface="Arial"/>
+                <a:ea typeface="Noto Sans CJK SC"/>
+              </a:rPr>
+              <a:t>Usad las notas.</a:t>
+            </a:r>
+            <a:r>
+              <a:rPr b="0" lang="es-ES" sz="1200" spc="-1" strike="noStrike">
+                <a:solidFill>
+                  <a:srgbClr val="000000"/>
+                </a:solidFill>
+                <a:latin typeface="Arial"/>
+                <a:ea typeface="Noto Sans CJK SC"/>
+              </a:rPr>
+              <a:t> Muchos CRM te permiten crear notas de cada contacto, usad esas notas para guardar información variada, por ejemplo, el contenido de las áreas de texto de un formulario. Ponéis un título explicativo y luego el texto que escribió la persona que relleno el formulario. Siempre que se pueda, </a:t>
+            </a:r>
+            <a:r>
+              <a:rPr b="1" lang="es-ES" sz="1200" spc="-1" strike="noStrike">
+                <a:solidFill>
+                  <a:srgbClr val="000000"/>
+                </a:solidFill>
+                <a:latin typeface="Arial"/>
+                <a:ea typeface="Noto Sans CJK SC"/>
+              </a:rPr>
+              <a:t>no montéis campos específicos para ese tipo de cosas</a:t>
+            </a:r>
+            <a:r>
+              <a:rPr b="0" lang="es-ES" sz="1200" spc="-1" strike="noStrike">
+                <a:solidFill>
+                  <a:srgbClr val="000000"/>
+                </a:solidFill>
+                <a:latin typeface="Arial"/>
+                <a:ea typeface="Noto Sans CJK SC"/>
+              </a:rPr>
+              <a:t>.</a:t>
+            </a:r>
+            <a:endParaRPr b="0" lang="es-ES" sz="1200" spc="-1" strike="noStrike">
+              <a:solidFill>
+                <a:srgbClr val="000000"/>
+              </a:solidFill>
+              <a:latin typeface="Arial"/>
+            </a:endParaRPr>
+          </a:p>
+          <a:p>
+            <a:pPr marL="432000" indent="-324000">
+              <a:lnSpc>
+                <a:spcPct val="100000"/>
+              </a:lnSpc>
+              <a:spcBef>
+                <a:spcPts val="624"/>
+              </a:spcBef>
+              <a:spcAft>
+                <a:spcPts val="425"/>
+              </a:spcAft>
+              <a:buClr>
+                <a:srgbClr val="000000"/>
+              </a:buClr>
+              <a:buSzPct val="45000"/>
+              <a:buFont typeface="Wingdings" charset="2"/>
+              <a:buChar char=""/>
+            </a:pPr>
+            <a:r>
+              <a:rPr b="1" lang="es-ES" sz="1200" spc="-1" strike="noStrike">
+                <a:solidFill>
+                  <a:srgbClr val="000000"/>
+                </a:solidFill>
+                <a:latin typeface="Arial"/>
+                <a:ea typeface="Noto Sans CJK SC"/>
+              </a:rPr>
+              <a:t>Si puedes hacerse con una automatización del CRM, mejor que programándolo.</a:t>
+            </a:r>
+            <a:r>
+              <a:rPr b="0" lang="es-ES" sz="1200" spc="-1" strike="noStrike">
+                <a:solidFill>
+                  <a:srgbClr val="000000"/>
+                </a:solidFill>
+                <a:latin typeface="Arial"/>
+                <a:ea typeface="Noto Sans CJK SC"/>
+              </a:rPr>
+              <a:t> Al conectar se puede hacer que el script que desarrolléis haga todas las tareas, como meter etiquetas, apuntar a listas, meter puntos en un LeadScoring, etc. O simplemente que lance un disparador de una automatización y esta ejecute todo lo anterior. Piensa que </a:t>
+            </a:r>
+            <a:r>
+              <a:rPr b="1" lang="es-ES" sz="1200" spc="-1" strike="noStrike">
+                <a:solidFill>
+                  <a:srgbClr val="000000"/>
+                </a:solidFill>
+                <a:latin typeface="Arial"/>
+                <a:ea typeface="Noto Sans CJK SC"/>
+              </a:rPr>
+              <a:t>cambiar la programación solo podrá hacerlo una desarrolladora y cambiar una automatización con una interfaz gráfica, puede hacerlo cualquier persona de marketing con unos conocimientos básicos</a:t>
+            </a:r>
+            <a:r>
+              <a:rPr b="0" lang="es-ES" sz="1200" spc="-1" strike="noStrike">
+                <a:solidFill>
+                  <a:srgbClr val="000000"/>
+                </a:solidFill>
+                <a:latin typeface="Arial"/>
+                <a:ea typeface="Noto Sans CJK SC"/>
+              </a:rPr>
+              <a:t>.</a:t>
+            </a:r>
+            <a:endParaRPr b="0" lang="es-ES" sz="1200" spc="-1" strike="noStrike">
+              <a:solidFill>
+                <a:srgbClr val="000000"/>
+              </a:solidFill>
+              <a:latin typeface="Arial"/>
+            </a:endParaRPr>
+          </a:p>
+          <a:p>
+            <a:pPr marL="432000" indent="-324000">
+              <a:lnSpc>
+                <a:spcPct val="100000"/>
+              </a:lnSpc>
+              <a:spcBef>
+                <a:spcPts val="624"/>
+              </a:spcBef>
+              <a:spcAft>
+                <a:spcPts val="425"/>
+              </a:spcAft>
+              <a:buClr>
+                <a:srgbClr val="000000"/>
+              </a:buClr>
+              <a:buSzPct val="45000"/>
+              <a:buFont typeface="Wingdings" charset="2"/>
+              <a:buChar char=""/>
+            </a:pPr>
+            <a:r>
+              <a:rPr b="1" lang="es-ES" sz="1200" spc="-1" strike="noStrike">
+                <a:solidFill>
+                  <a:srgbClr val="000000"/>
+                </a:solidFill>
+                <a:latin typeface="Arial"/>
+                <a:ea typeface="Noto Sans CJK SC"/>
+              </a:rPr>
+              <a:t>Usad los sistemas de almacenamiento de ficheros de PDF, DOC, ODT, etc. que ofrecen los CRM.</a:t>
+            </a:r>
+            <a:r>
+              <a:rPr b="0" lang="es-ES" sz="1200" spc="-1" strike="noStrike">
+                <a:solidFill>
+                  <a:srgbClr val="000000"/>
+                </a:solidFill>
+                <a:latin typeface="Arial"/>
+                <a:ea typeface="Noto Sans CJK SC"/>
+              </a:rPr>
+              <a:t> Es muy tentador subir un fichero a tu web y usar ese enlace en todas partes. Pero no da gran información. Subiéndolo al sistema de archivos del CRM puedes saber quién y cuándo lo ha descargado si está entre tus contactos y si no, como, mínimo te dará unas buenas estadísticas de descargas.</a:t>
+            </a:r>
+            <a:endParaRPr b="0" lang="es-ES" sz="1200" spc="-1" strike="noStrike">
+              <a:solidFill>
+                <a:srgbClr val="000000"/>
+              </a:solidFill>
+              <a:latin typeface="Arial"/>
+            </a:endParaRPr>
+          </a:p>
+        </p:txBody>
+      </p:sp>
     </p:spTree>
   </p:cSld>
   <mc:AlternateContent>
@@ -7174,7 +6871,7 @@
       </p:grpSpPr>
       <p:sp>
         <p:nvSpPr>
-          <p:cNvPr id="100" name="PlaceHolder 1"/>
+          <p:cNvPr id="99" name="PlaceHolder 1"/>
           <p:cNvSpPr>
             <a:spLocks noGrp="1"/>
           </p:cNvSpPr>
@@ -7184,8 +6881,8 @@
         </p:nvSpPr>
         <p:spPr>
           <a:xfrm>
-            <a:off x="2520000" y="294120"/>
-            <a:ext cx="6310440" cy="520920"/>
+            <a:off x="2340000" y="294120"/>
+            <a:ext cx="6490440" cy="520920"/>
           </a:xfrm>
           <a:prstGeom prst="rect">
             <a:avLst/>
@@ -7204,12 +6901,6 @@
               <a:lnSpc>
                 <a:spcPct val="100000"/>
               </a:lnSpc>
-              <a:spcBef>
-                <a:spcPts val="1191"/>
-              </a:spcBef>
-              <a:spcAft>
-                <a:spcPts val="992"/>
-              </a:spcAft>
               <a:buNone/>
               <a:tabLst>
                 <a:tab algn="l" pos="0"/>
@@ -7218,20 +6909,20 @@
             <a:r>
               <a:rPr b="1" lang="es-ES" sz="1800" spc="-1" strike="noStrike">
                 <a:solidFill>
-                  <a:srgbClr val="000000"/>
-                </a:solidFill>
-                <a:latin typeface="Arial"/>
-              </a:rPr>
-              <a:t>Conexión directa a la API o crear un middleware</a:t>
+                  <a:srgbClr val="174575"/>
+                </a:solidFill>
+                <a:latin typeface="Arial"/>
+              </a:rPr>
+              <a:t>Sobre mí</a:t>
             </a:r>
             <a:r>
               <a:rPr b="0" lang="es-ES" sz="1800" spc="-1" strike="noStrike">
                 <a:solidFill>
-                  <a:srgbClr val="000000"/>
-                </a:solidFill>
-                <a:latin typeface="Arial"/>
-              </a:rPr>
-              <a:t> c[_]</a:t>
+                  <a:srgbClr val="174575"/>
+                </a:solidFill>
+                <a:latin typeface="Arial"/>
+              </a:rPr>
+              <a:t> O=('-'Q)</a:t>
             </a:r>
             <a:endParaRPr b="0" lang="es-ES" sz="1800" spc="-1" strike="noStrike">
               <a:solidFill>
@@ -7244,7 +6935,7 @@
       </p:sp>
       <p:sp>
         <p:nvSpPr>
-          <p:cNvPr id="101" name="PlaceHolder 2"/>
+          <p:cNvPr id="100" name="PlaceHolder 2"/>
           <p:cNvSpPr>
             <a:spLocks noGrp="1"/>
           </p:cNvSpPr>
@@ -7317,350 +7008,7 @@
       </p:grpSpPr>
       <p:sp>
         <p:nvSpPr>
-          <p:cNvPr id="102" name="PlaceHolder 1"/>
-          <p:cNvSpPr>
-            <a:spLocks noGrp="1"/>
-          </p:cNvSpPr>
-          <p:nvPr>
-            <p:ph type="title"/>
-          </p:nvPr>
-        </p:nvSpPr>
-        <p:spPr>
-          <a:xfrm>
-            <a:off x="2340000" y="198360"/>
-            <a:ext cx="6490440" cy="520920"/>
-          </a:xfrm>
-          <a:prstGeom prst="rect">
-            <a:avLst/>
-          </a:prstGeom>
-          <a:noFill/>
-          <a:ln w="0">
-            <a:noFill/>
-          </a:ln>
-        </p:spPr>
-        <p:txBody>
-          <a:bodyPr lIns="91440" rIns="91440" tIns="91440" bIns="91440" anchor="t">
-            <a:normAutofit/>
-          </a:bodyPr>
-          <a:p>
-            <a:pPr indent="0" algn="r">
-              <a:lnSpc>
-                <a:spcPct val="100000"/>
-              </a:lnSpc>
-              <a:buNone/>
-              <a:tabLst>
-                <a:tab algn="l" pos="0"/>
-              </a:tabLst>
-            </a:pPr>
-            <a:r>
-              <a:rPr b="1" lang="es-ES" sz="1800" spc="-1" strike="noStrike">
-                <a:solidFill>
-                  <a:srgbClr val="174575"/>
-                </a:solidFill>
-                <a:latin typeface="Arial"/>
-              </a:rPr>
-              <a:t>Consejos</a:t>
-            </a:r>
-            <a:r>
-              <a:rPr b="0" lang="es-ES" sz="1800" spc="-1" strike="noStrike">
-                <a:solidFill>
-                  <a:srgbClr val="174575"/>
-                </a:solidFill>
-                <a:latin typeface="Arial"/>
-              </a:rPr>
-              <a:t>❚█══█❚</a:t>
-            </a:r>
-            <a:endParaRPr b="0" lang="es-ES" sz="1800" spc="-1" strike="noStrike">
-              <a:solidFill>
-                <a:srgbClr val="000000"/>
-              </a:solidFill>
-              <a:latin typeface="Arial"/>
-            </a:endParaRPr>
-          </a:p>
-        </p:txBody>
-      </p:sp>
-      <p:sp>
-        <p:nvSpPr>
-          <p:cNvPr id="103" name="PlaceHolder 2"/>
-          <p:cNvSpPr>
-            <a:spLocks noGrp="1"/>
-          </p:cNvSpPr>
-          <p:nvPr>
-            <p:ph/>
-          </p:nvPr>
-        </p:nvSpPr>
-        <p:spPr>
-          <a:xfrm>
-            <a:off x="311760" y="900000"/>
-            <a:ext cx="8518680" cy="3678120"/>
-          </a:xfrm>
-          <a:prstGeom prst="rect">
-            <a:avLst/>
-          </a:prstGeom>
-          <a:noFill/>
-          <a:ln w="0">
-            <a:noFill/>
-          </a:ln>
-        </p:spPr>
-        <p:txBody>
-          <a:bodyPr lIns="91440" rIns="91440" tIns="91440" bIns="91440" anchor="t">
-            <a:normAutofit/>
-          </a:bodyPr>
-          <a:p>
-            <a:pPr marL="432000" indent="-324000">
-              <a:lnSpc>
-                <a:spcPct val="100000"/>
-              </a:lnSpc>
-              <a:spcBef>
-                <a:spcPts val="624"/>
-              </a:spcBef>
-              <a:spcAft>
-                <a:spcPts val="425"/>
-              </a:spcAft>
-              <a:buClr>
-                <a:srgbClr val="000000"/>
-              </a:buClr>
-              <a:buSzPct val="45000"/>
-              <a:buFont typeface="Wingdings" charset="2"/>
-              <a:buChar char=""/>
-            </a:pPr>
-            <a:r>
-              <a:rPr b="1" lang="es-ES" sz="1200" spc="-1" strike="noStrike">
-                <a:solidFill>
-                  <a:srgbClr val="000000"/>
-                </a:solidFill>
-                <a:latin typeface="Arial"/>
-                <a:ea typeface="Noto Sans CJK SC"/>
-              </a:rPr>
-              <a:t>Cread un campo de fecha de última modificación.</a:t>
-            </a:r>
-            <a:r>
-              <a:rPr b="0" lang="es-ES" sz="1200" spc="-1" strike="noStrike">
-                <a:solidFill>
-                  <a:srgbClr val="000000"/>
-                </a:solidFill>
-                <a:latin typeface="Arial"/>
-                <a:ea typeface="Noto Sans CJK SC"/>
-              </a:rPr>
-              <a:t> Los CRM suelen guardar está información, pero no discriminan entre conexiones por API y directamente por web. Con este campo personalizado tendréis control de qué contactos habéis tocado desde WordPress y cuáles han sido tocados de otras formas.</a:t>
-            </a:r>
-            <a:endParaRPr b="0" lang="es-ES" sz="1200" spc="-1" strike="noStrike">
-              <a:solidFill>
-                <a:srgbClr val="000000"/>
-              </a:solidFill>
-              <a:latin typeface="Arial"/>
-            </a:endParaRPr>
-          </a:p>
-          <a:p>
-            <a:pPr marL="432000" indent="-324000">
-              <a:lnSpc>
-                <a:spcPct val="100000"/>
-              </a:lnSpc>
-              <a:spcBef>
-                <a:spcPts val="624"/>
-              </a:spcBef>
-              <a:spcAft>
-                <a:spcPts val="425"/>
-              </a:spcAft>
-              <a:buClr>
-                <a:srgbClr val="000000"/>
-              </a:buClr>
-              <a:buSzPct val="45000"/>
-              <a:buFont typeface="Wingdings" charset="2"/>
-              <a:buChar char=""/>
-            </a:pPr>
-            <a:r>
-              <a:rPr b="1" lang="es-ES" sz="1200" spc="-1" strike="noStrike">
-                <a:solidFill>
-                  <a:srgbClr val="000000"/>
-                </a:solidFill>
-                <a:latin typeface="Arial"/>
-                <a:ea typeface="Noto Sans CJK SC"/>
-              </a:rPr>
-              <a:t>Usad las notas.</a:t>
-            </a:r>
-            <a:r>
-              <a:rPr b="0" lang="es-ES" sz="1200" spc="-1" strike="noStrike">
-                <a:solidFill>
-                  <a:srgbClr val="000000"/>
-                </a:solidFill>
-                <a:latin typeface="Arial"/>
-                <a:ea typeface="Noto Sans CJK SC"/>
-              </a:rPr>
-              <a:t> Muchos CRM te permiten crear notas de cada contacto, usad esas notas para guardar información variada, por ejemplo, el contenido de las áreas de texto de un formulario. Ponéis un título explicativo y luego el texto que escribió la persona que relleno el formulario. Siempre que se pueda, </a:t>
-            </a:r>
-            <a:r>
-              <a:rPr b="1" lang="es-ES" sz="1200" spc="-1" strike="noStrike">
-                <a:solidFill>
-                  <a:srgbClr val="000000"/>
-                </a:solidFill>
-                <a:latin typeface="Arial"/>
-                <a:ea typeface="Noto Sans CJK SC"/>
-              </a:rPr>
-              <a:t>no montéis campos específicos para ese tipo de cosas</a:t>
-            </a:r>
-            <a:r>
-              <a:rPr b="0" lang="es-ES" sz="1200" spc="-1" strike="noStrike">
-                <a:solidFill>
-                  <a:srgbClr val="000000"/>
-                </a:solidFill>
-                <a:latin typeface="Arial"/>
-                <a:ea typeface="Noto Sans CJK SC"/>
-              </a:rPr>
-              <a:t>.</a:t>
-            </a:r>
-            <a:endParaRPr b="0" lang="es-ES" sz="1200" spc="-1" strike="noStrike">
-              <a:solidFill>
-                <a:srgbClr val="000000"/>
-              </a:solidFill>
-              <a:latin typeface="Arial"/>
-            </a:endParaRPr>
-          </a:p>
-          <a:p>
-            <a:pPr marL="432000" indent="-324000">
-              <a:lnSpc>
-                <a:spcPct val="100000"/>
-              </a:lnSpc>
-              <a:spcBef>
-                <a:spcPts val="624"/>
-              </a:spcBef>
-              <a:spcAft>
-                <a:spcPts val="425"/>
-              </a:spcAft>
-              <a:buClr>
-                <a:srgbClr val="000000"/>
-              </a:buClr>
-              <a:buSzPct val="45000"/>
-              <a:buFont typeface="Wingdings" charset="2"/>
-              <a:buChar char=""/>
-            </a:pPr>
-            <a:r>
-              <a:rPr b="1" lang="es-ES" sz="1200" spc="-1" strike="noStrike">
-                <a:solidFill>
-                  <a:srgbClr val="000000"/>
-                </a:solidFill>
-                <a:latin typeface="Arial"/>
-                <a:ea typeface="Noto Sans CJK SC"/>
-              </a:rPr>
-              <a:t>Si puedes hacerse con una automatización del CRM, mejor que programándolo.</a:t>
-            </a:r>
-            <a:r>
-              <a:rPr b="0" lang="es-ES" sz="1200" spc="-1" strike="noStrike">
-                <a:solidFill>
-                  <a:srgbClr val="000000"/>
-                </a:solidFill>
-                <a:latin typeface="Arial"/>
-                <a:ea typeface="Noto Sans CJK SC"/>
-              </a:rPr>
-              <a:t> Al conectar se puede hacer que el script que desarrolléis haga todas las tareas, como meter etiquetas, apuntar a listas, meter puntos en un LeadScoring, etc. O simplemente que lance un disparador de una automatización y esta ejecute todo lo anterior. Piensa que </a:t>
-            </a:r>
-            <a:r>
-              <a:rPr b="1" lang="es-ES" sz="1200" spc="-1" strike="noStrike">
-                <a:solidFill>
-                  <a:srgbClr val="000000"/>
-                </a:solidFill>
-                <a:latin typeface="Arial"/>
-                <a:ea typeface="Noto Sans CJK SC"/>
-              </a:rPr>
-              <a:t>cambiar la programación solo podrá hacerlo una desarrolladora y cambiar una automatización con una interfaz gráfica, puede hacerlo cualquier persona de marketing con unos conocimientos básicos</a:t>
-            </a:r>
-            <a:r>
-              <a:rPr b="0" lang="es-ES" sz="1200" spc="-1" strike="noStrike">
-                <a:solidFill>
-                  <a:srgbClr val="000000"/>
-                </a:solidFill>
-                <a:latin typeface="Arial"/>
-                <a:ea typeface="Noto Sans CJK SC"/>
-              </a:rPr>
-              <a:t>.</a:t>
-            </a:r>
-            <a:endParaRPr b="0" lang="es-ES" sz="1200" spc="-1" strike="noStrike">
-              <a:solidFill>
-                <a:srgbClr val="000000"/>
-              </a:solidFill>
-              <a:latin typeface="Arial"/>
-            </a:endParaRPr>
-          </a:p>
-          <a:p>
-            <a:pPr marL="432000" indent="-324000">
-              <a:lnSpc>
-                <a:spcPct val="100000"/>
-              </a:lnSpc>
-              <a:spcBef>
-                <a:spcPts val="624"/>
-              </a:spcBef>
-              <a:spcAft>
-                <a:spcPts val="425"/>
-              </a:spcAft>
-              <a:buClr>
-                <a:srgbClr val="000000"/>
-              </a:buClr>
-              <a:buSzPct val="45000"/>
-              <a:buFont typeface="Wingdings" charset="2"/>
-              <a:buChar char=""/>
-            </a:pPr>
-            <a:r>
-              <a:rPr b="1" lang="es-ES" sz="1200" spc="-1" strike="noStrike">
-                <a:solidFill>
-                  <a:srgbClr val="000000"/>
-                </a:solidFill>
-                <a:latin typeface="Arial"/>
-                <a:ea typeface="Noto Sans CJK SC"/>
-              </a:rPr>
-              <a:t>Usad los sistemas de almacenamiento de ficheros de PDF, DOC, ODT, etc. que ofrecen los CRM.</a:t>
-            </a:r>
-            <a:r>
-              <a:rPr b="0" lang="es-ES" sz="1200" spc="-1" strike="noStrike">
-                <a:solidFill>
-                  <a:srgbClr val="000000"/>
-                </a:solidFill>
-                <a:latin typeface="Arial"/>
-                <a:ea typeface="Noto Sans CJK SC"/>
-              </a:rPr>
-              <a:t> Es muy tentador subir un fichero a tu web y usar ese enlace en todas partes. Pero no da gran información. Subiéndolo al sistema de archivos del CRM puedes saber quién y cuándo lo ha descargado si está entre tus contactos y si no, como, mínimo te dará unas buenas estadísticas de descargas.</a:t>
-            </a:r>
-            <a:endParaRPr b="0" lang="es-ES" sz="1200" spc="-1" strike="noStrike">
-              <a:solidFill>
-                <a:srgbClr val="000000"/>
-              </a:solidFill>
-              <a:latin typeface="Arial"/>
-            </a:endParaRPr>
-          </a:p>
-        </p:txBody>
-      </p:sp>
-    </p:spTree>
-  </p:cSld>
-  <mc:AlternateContent>
-    <mc:Choice Requires="p14">
-      <p:transition spd="slow" p14:dur="2000"/>
-    </mc:Choice>
-    <mc:Fallback>
-      <p:transition spd="slow"/>
-    </mc:Fallback>
-  </mc:AlternateContent>
-</p:sld>
-</file>
-
-<file path=ppt/slides/slide19.xml><?xml version="1.0" encoding="utf-8"?>
-<p:sld xmlns:a="http://schemas.openxmlformats.org/drawingml/2006/main" xmlns:p="http://schemas.openxmlformats.org/presentationml/2006/main" xmlns:r="http://schemas.openxmlformats.org/officeDocument/2006/relationships" xmlns:p14="http://schemas.microsoft.com/office/powerpoint/2010/main" xmlns:p15="http://schemas.microsoft.com/office/powerpoint/2012/main" xmlns:mc="http://schemas.openxmlformats.org/markup-compatibility/2006">
-  <p:cSld>
-    <p:spTree>
-      <p:nvGrpSpPr>
-        <p:cNvPr id="1" name=""/>
-        <p:cNvGrpSpPr/>
-        <p:nvPr/>
-      </p:nvGrpSpPr>
-      <p:grpSpPr>
-        <a:xfrm>
-          <a:off x="0" y="0"/>
-          <a:ext cx="0" cy="0"/>
-          <a:chOff x="0" y="0"/>
-          <a:chExt cx="0" cy="0"/>
-        </a:xfrm>
-      </p:grpSpPr>
-      <p:sp>
-        <p:nvSpPr>
-          <p:cNvPr id="104" name="PlaceHolder 1"/>
+          <p:cNvPr id="101" name="PlaceHolder 1"/>
           <p:cNvSpPr>
             <a:spLocks noGrp="1"/>
           </p:cNvSpPr>
@@ -7702,7 +7050,7 @@
                 </a:solidFill>
                 <a:latin typeface="Arial"/>
               </a:rPr>
-              <a:t>Sobre mí</a:t>
+              <a:t>Enlaces</a:t>
             </a:r>
             <a:r>
               <a:rPr b="0" lang="es-ES" sz="1800" spc="-1" strike="noStrike">
@@ -7711,7 +7059,7 @@
                 </a:solidFill>
                 <a:latin typeface="Arial"/>
               </a:rPr>
-              <a:t> O=('-'Q)</a:t>
+              <a:t> [♥]]] [♦]]] [♣]]] [♠]]]</a:t>
             </a:r>
             <a:endParaRPr b="0" lang="es-ES" sz="1800" spc="-1" strike="noStrike">
               <a:solidFill>
@@ -7724,7 +7072,7 @@
       </p:sp>
       <p:sp>
         <p:nvSpPr>
-          <p:cNvPr id="105" name="PlaceHolder 2"/>
+          <p:cNvPr id="102" name="PlaceHolder 2"/>
           <p:cNvSpPr>
             <a:spLocks noGrp="1"/>
           </p:cNvSpPr>
@@ -7985,143 +7333,6 @@
           </a:ln>
         </p:spPr>
       </p:pic>
-    </p:spTree>
-  </p:cSld>
-  <mc:AlternateContent>
-    <mc:Choice Requires="p14">
-      <p:transition spd="slow" p14:dur="2000"/>
-    </mc:Choice>
-    <mc:Fallback>
-      <p:transition spd="slow"/>
-    </mc:Fallback>
-  </mc:AlternateContent>
-</p:sld>
-</file>
-
-<file path=ppt/slides/slide20.xml><?xml version="1.0" encoding="utf-8"?>
-<p:sld xmlns:a="http://schemas.openxmlformats.org/drawingml/2006/main" xmlns:p="http://schemas.openxmlformats.org/presentationml/2006/main" xmlns:r="http://schemas.openxmlformats.org/officeDocument/2006/relationships" xmlns:p14="http://schemas.microsoft.com/office/powerpoint/2010/main" xmlns:p15="http://schemas.microsoft.com/office/powerpoint/2012/main" xmlns:mc="http://schemas.openxmlformats.org/markup-compatibility/2006">
-  <p:cSld>
-    <p:spTree>
-      <p:nvGrpSpPr>
-        <p:cNvPr id="1" name=""/>
-        <p:cNvGrpSpPr/>
-        <p:nvPr/>
-      </p:nvGrpSpPr>
-      <p:grpSpPr>
-        <a:xfrm>
-          <a:off x="0" y="0"/>
-          <a:ext cx="0" cy="0"/>
-          <a:chOff x="0" y="0"/>
-          <a:chExt cx="0" cy="0"/>
-        </a:xfrm>
-      </p:grpSpPr>
-      <p:sp>
-        <p:nvSpPr>
-          <p:cNvPr id="106" name="PlaceHolder 1"/>
-          <p:cNvSpPr>
-            <a:spLocks noGrp="1"/>
-          </p:cNvSpPr>
-          <p:nvPr>
-            <p:ph type="title"/>
-          </p:nvPr>
-        </p:nvSpPr>
-        <p:spPr>
-          <a:xfrm>
-            <a:off x="2340000" y="294120"/>
-            <a:ext cx="6490440" cy="520920"/>
-          </a:xfrm>
-          <a:prstGeom prst="rect">
-            <a:avLst/>
-          </a:prstGeom>
-          <a:noFill/>
-          <a:ln w="0">
-            <a:noFill/>
-          </a:ln>
-        </p:spPr>
-        <p:txBody>
-          <a:bodyPr lIns="91440" rIns="91440" tIns="91440" bIns="91440" anchor="t">
-            <a:normAutofit/>
-          </a:bodyPr>
-          <a:p>
-            <a:pPr indent="0" algn="r">
-              <a:lnSpc>
-                <a:spcPct val="100000"/>
-              </a:lnSpc>
-              <a:buNone/>
-              <a:tabLst>
-                <a:tab algn="l" pos="0"/>
-              </a:tabLst>
-            </a:pPr>
-            <a:r>
-              <a:rPr b="1" lang="es-ES" sz="1800" spc="-1" strike="noStrike">
-                <a:solidFill>
-                  <a:srgbClr val="174575"/>
-                </a:solidFill>
-                <a:latin typeface="Arial"/>
-              </a:rPr>
-              <a:t>Enlaces</a:t>
-            </a:r>
-            <a:r>
-              <a:rPr b="0" lang="es-ES" sz="1800" spc="-1" strike="noStrike">
-                <a:solidFill>
-                  <a:srgbClr val="174575"/>
-                </a:solidFill>
-                <a:latin typeface="Arial"/>
-              </a:rPr>
-              <a:t> [♥]]] [♦]]] [♣]]] [♠]]]</a:t>
-            </a:r>
-            <a:endParaRPr b="0" lang="es-ES" sz="1800" spc="-1" strike="noStrike">
-              <a:solidFill>
-                <a:srgbClr val="000000"/>
-              </a:solidFill>
-              <a:latin typeface="Arial"/>
-            </a:endParaRPr>
-          </a:p>
-        </p:txBody>
-      </p:sp>
-      <p:sp>
-        <p:nvSpPr>
-          <p:cNvPr id="107" name="PlaceHolder 2"/>
-          <p:cNvSpPr>
-            <a:spLocks noGrp="1"/>
-          </p:cNvSpPr>
-          <p:nvPr>
-            <p:ph/>
-          </p:nvPr>
-        </p:nvSpPr>
-        <p:spPr>
-          <a:xfrm>
-            <a:off x="311760" y="1461600"/>
-            <a:ext cx="8518680" cy="3116520"/>
-          </a:xfrm>
-          <a:prstGeom prst="rect">
-            <a:avLst/>
-          </a:prstGeom>
-          <a:noFill/>
-          <a:ln w="0">
-            <a:noFill/>
-          </a:ln>
-        </p:spPr>
-        <p:txBody>
-          <a:bodyPr lIns="91440" rIns="91440" tIns="91440" bIns="91440" anchor="t">
-            <a:normAutofit/>
-          </a:bodyPr>
-          <a:p>
-            <a:pPr indent="0">
-              <a:spcBef>
-                <a:spcPts val="1417"/>
-              </a:spcBef>
-              <a:buNone/>
-            </a:pPr>
-            <a:endParaRPr b="0" lang="es-ES" sz="1800" spc="-1" strike="noStrike">
-              <a:solidFill>
-                <a:srgbClr val="000000"/>
-              </a:solidFill>
-              <a:latin typeface="Arial"/>
-            </a:endParaRPr>
-          </a:p>
-        </p:txBody>
-      </p:sp>
     </p:spTree>
   </p:cSld>
   <mc:AlternateContent>
@@ -10560,20 +9771,20 @@
             <a:r>
               <a:rPr b="1" lang="es-ES" sz="1800" spc="-1" strike="noStrike">
                 <a:solidFill>
-                  <a:srgbClr val="000000"/>
-                </a:solidFill>
-                <a:latin typeface="Arial"/>
-              </a:rPr>
-              <a:t>URL de tracking de clics</a:t>
+                  <a:srgbClr val="174575"/>
+                </a:solidFill>
+                <a:latin typeface="Arial"/>
+              </a:rPr>
+              <a:t>Formularios </a:t>
             </a:r>
             <a:r>
               <a:rPr b="0" lang="es-ES" sz="1800" spc="-1" strike="noStrike">
                 <a:solidFill>
-                  <a:srgbClr val="000000"/>
-                </a:solidFill>
-                <a:latin typeface="Arial"/>
-              </a:rPr>
-              <a:t> ♫♪.ılılıll|̲̅̅●̲̅̅|̲̅̅=̲̅̅|̲̅̅●̲̅̅|llılılı.♫♪</a:t>
+                  <a:srgbClr val="174575"/>
+                </a:solidFill>
+                <a:latin typeface="Arial"/>
+              </a:rPr>
+              <a:t>[̲̅$̲̅(̲̅ιοο̲̅)̲̅$̲̅]</a:t>
             </a:r>
             <a:endParaRPr b="0" lang="es-ES" sz="1800" spc="-1" strike="noStrike">
               <a:solidFill>
@@ -10597,7 +9808,7 @@
         <p:spPr>
           <a:xfrm>
             <a:off x="311760" y="1461600"/>
-            <a:ext cx="8518680" cy="3116520"/>
+            <a:ext cx="5087520" cy="3116520"/>
           </a:xfrm>
           <a:prstGeom prst="rect">
             <a:avLst/>
@@ -10613,11 +9824,173 @@
           </a:bodyPr>
           <a:p>
             <a:pPr indent="0">
-              <a:spcBef>
-                <a:spcPts val="1417"/>
-              </a:spcBef>
+              <a:lnSpc>
+                <a:spcPct val="100000"/>
+              </a:lnSpc>
+              <a:spcBef>
+                <a:spcPts val="1191"/>
+              </a:spcBef>
+              <a:spcAft>
+                <a:spcPts val="992"/>
+              </a:spcAft>
               <a:buNone/>
-            </a:pPr>
+              <a:tabLst>
+                <a:tab algn="l" pos="0"/>
+              </a:tabLst>
+            </a:pPr>
+            <a:r>
+              <a:rPr b="0" lang="es-ES" sz="1800" spc="-1" strike="noStrike">
+                <a:solidFill>
+                  <a:srgbClr val="000000"/>
+                </a:solidFill>
+                <a:latin typeface="Arial"/>
+              </a:rPr>
+              <a:t>La forma más común de conexión entre WordPress y Un CRM es mediante formularios. Está conexión se puede hacer mediante diferentes formas.</a:t>
+            </a:r>
+            <a:endParaRPr b="0" lang="es-ES" sz="1800" spc="-1" strike="noStrike">
+              <a:solidFill>
+                <a:srgbClr val="000000"/>
+              </a:solidFill>
+              <a:latin typeface="Arial"/>
+            </a:endParaRPr>
+          </a:p>
+          <a:p>
+            <a:pPr marL="720000" indent="-324000">
+              <a:lnSpc>
+                <a:spcPct val="100000"/>
+              </a:lnSpc>
+              <a:spcBef>
+                <a:spcPts val="340"/>
+              </a:spcBef>
+              <a:spcAft>
+                <a:spcPts val="142"/>
+              </a:spcAft>
+              <a:buClr>
+                <a:srgbClr val="000000"/>
+              </a:buClr>
+              <a:buFont typeface="Symbol" charset="2"/>
+              <a:buChar char=""/>
+              <a:tabLst>
+                <a:tab algn="l" pos="0"/>
+              </a:tabLst>
+            </a:pPr>
+            <a:r>
+              <a:rPr b="0" lang="es-ES" sz="1800" spc="-1" strike="noStrike">
+                <a:solidFill>
+                  <a:srgbClr val="000000"/>
+                </a:solidFill>
+                <a:latin typeface="Arial"/>
+              </a:rPr>
+              <a:t>Incrustados</a:t>
+            </a:r>
+            <a:endParaRPr b="0" lang="es-ES" sz="1800" spc="-1" strike="noStrike">
+              <a:solidFill>
+                <a:srgbClr val="000000"/>
+              </a:solidFill>
+              <a:latin typeface="Arial"/>
+            </a:endParaRPr>
+          </a:p>
+          <a:p>
+            <a:pPr marL="720000" indent="-324000">
+              <a:lnSpc>
+                <a:spcPct val="100000"/>
+              </a:lnSpc>
+              <a:spcBef>
+                <a:spcPts val="340"/>
+              </a:spcBef>
+              <a:spcAft>
+                <a:spcPts val="142"/>
+              </a:spcAft>
+              <a:buClr>
+                <a:srgbClr val="000000"/>
+              </a:buClr>
+              <a:buFont typeface="Symbol" charset="2"/>
+              <a:buChar char=""/>
+              <a:tabLst>
+                <a:tab algn="l" pos="0"/>
+              </a:tabLst>
+            </a:pPr>
+            <a:r>
+              <a:rPr b="0" lang="es-ES" sz="1800" spc="-1" strike="noStrike">
+                <a:solidFill>
+                  <a:srgbClr val="000000"/>
+                </a:solidFill>
+                <a:latin typeface="Arial"/>
+              </a:rPr>
+              <a:t>Conectados con un plugin</a:t>
+            </a:r>
+            <a:endParaRPr b="0" lang="es-ES" sz="1800" spc="-1" strike="noStrike">
+              <a:solidFill>
+                <a:srgbClr val="000000"/>
+              </a:solidFill>
+              <a:latin typeface="Arial"/>
+            </a:endParaRPr>
+          </a:p>
+          <a:p>
+            <a:pPr marL="720000" indent="-324000">
+              <a:lnSpc>
+                <a:spcPct val="100000"/>
+              </a:lnSpc>
+              <a:spcBef>
+                <a:spcPts val="340"/>
+              </a:spcBef>
+              <a:spcAft>
+                <a:spcPts val="142"/>
+              </a:spcAft>
+              <a:buClr>
+                <a:srgbClr val="000000"/>
+              </a:buClr>
+              <a:buFont typeface="Symbol" charset="2"/>
+              <a:buChar char=""/>
+              <a:tabLst>
+                <a:tab algn="l" pos="0"/>
+              </a:tabLst>
+            </a:pPr>
+            <a:r>
+              <a:rPr b="0" lang="es-ES" sz="1800" spc="-1" strike="noStrike">
+                <a:solidFill>
+                  <a:srgbClr val="000000"/>
+                </a:solidFill>
+                <a:latin typeface="Arial"/>
+              </a:rPr>
+              <a:t>Conectados con un desarrollo propio</a:t>
+            </a:r>
+            <a:endParaRPr b="0" lang="es-ES" sz="1800" spc="-1" strike="noStrike">
+              <a:solidFill>
+                <a:srgbClr val="000000"/>
+              </a:solidFill>
+              <a:latin typeface="Arial"/>
+            </a:endParaRPr>
+          </a:p>
+          <a:p>
+            <a:pPr marL="720000" indent="-324000">
+              <a:lnSpc>
+                <a:spcPct val="100000"/>
+              </a:lnSpc>
+              <a:spcBef>
+                <a:spcPts val="340"/>
+              </a:spcBef>
+              <a:spcAft>
+                <a:spcPts val="142"/>
+              </a:spcAft>
+              <a:buClr>
+                <a:srgbClr val="000000"/>
+              </a:buClr>
+              <a:buFont typeface="Symbol" charset="2"/>
+              <a:buChar char=""/>
+              <a:tabLst>
+                <a:tab algn="l" pos="0"/>
+              </a:tabLst>
+            </a:pPr>
+            <a:r>
+              <a:rPr b="0" lang="es-ES" sz="1800" spc="-1" strike="noStrike">
+                <a:solidFill>
+                  <a:srgbClr val="000000"/>
+                </a:solidFill>
+                <a:latin typeface="Arial"/>
+              </a:rPr>
+              <a:t>Mixtos</a:t>
+            </a:r>
             <a:endParaRPr b="0" lang="es-ES" sz="1800" spc="-1" strike="noStrike">
               <a:solidFill>
                 <a:srgbClr val="000000"/>
@@ -10669,7 +10042,479 @@
         </p:nvSpPr>
         <p:spPr>
           <a:xfrm>
-            <a:off x="2328840" y="294120"/>
+            <a:off x="311760" y="815760"/>
+            <a:ext cx="8518680" cy="520920"/>
+          </a:xfrm>
+          <a:prstGeom prst="rect">
+            <a:avLst/>
+          </a:prstGeom>
+          <a:noFill/>
+          <a:ln w="0">
+            <a:noFill/>
+          </a:ln>
+        </p:spPr>
+        <p:txBody>
+          <a:bodyPr lIns="91440" rIns="91440" tIns="91440" bIns="91440" anchor="t">
+            <a:normAutofit/>
+          </a:bodyPr>
+          <a:p>
+            <a:pPr indent="0" algn="r">
+              <a:lnSpc>
+                <a:spcPct val="100000"/>
+              </a:lnSpc>
+              <a:spcBef>
+                <a:spcPts val="1191"/>
+              </a:spcBef>
+              <a:spcAft>
+                <a:spcPts val="992"/>
+              </a:spcAft>
+              <a:buNone/>
+              <a:tabLst>
+                <a:tab algn="l" pos="0"/>
+              </a:tabLst>
+            </a:pPr>
+            <a:r>
+              <a:rPr b="1" lang="es-ES" sz="1500" spc="-1" strike="noStrike">
+                <a:solidFill>
+                  <a:srgbClr val="000000"/>
+                </a:solidFill>
+                <a:latin typeface="Arial"/>
+                <a:ea typeface="Noto Sans CJK SC"/>
+              </a:rPr>
+              <a:t>Incrustados</a:t>
+            </a:r>
+            <a:r>
+              <a:rPr b="0" lang="es-ES" sz="1500" spc="-1" strike="noStrike">
+                <a:solidFill>
+                  <a:srgbClr val="000000"/>
+                </a:solidFill>
+                <a:latin typeface="Arial"/>
+                <a:ea typeface="Noto Sans CJK SC"/>
+              </a:rPr>
+              <a:t> ˁ˚ᴥ˚ˀ</a:t>
+            </a:r>
+            <a:endParaRPr b="0" lang="es-ES" sz="1500" spc="-1" strike="noStrike">
+              <a:solidFill>
+                <a:srgbClr val="000000"/>
+              </a:solidFill>
+              <a:latin typeface="Arial"/>
+            </a:endParaRPr>
+          </a:p>
+        </p:txBody>
+      </p:sp>
+      <p:sp>
+        <p:nvSpPr>
+          <p:cNvPr id="76" name="PlaceHolder 2"/>
+          <p:cNvSpPr>
+            <a:spLocks noGrp="1"/>
+          </p:cNvSpPr>
+          <p:nvPr>
+            <p:ph/>
+          </p:nvPr>
+        </p:nvSpPr>
+        <p:spPr>
+          <a:xfrm>
+            <a:off x="311760" y="1337400"/>
+            <a:ext cx="8518680" cy="3240720"/>
+          </a:xfrm>
+          <a:prstGeom prst="rect">
+            <a:avLst/>
+          </a:prstGeom>
+          <a:noFill/>
+          <a:ln w="0">
+            <a:noFill/>
+          </a:ln>
+        </p:spPr>
+        <p:txBody>
+          <a:bodyPr lIns="91440" rIns="91440" tIns="91440" bIns="91440" anchor="t">
+            <a:normAutofit fontScale="56111"/>
+          </a:bodyPr>
+          <a:p>
+            <a:pPr indent="0">
+              <a:lnSpc>
+                <a:spcPct val="100000"/>
+              </a:lnSpc>
+              <a:spcBef>
+                <a:spcPts val="340"/>
+              </a:spcBef>
+              <a:spcAft>
+                <a:spcPts val="283"/>
+              </a:spcAft>
+              <a:buNone/>
+              <a:tabLst>
+                <a:tab algn="l" pos="0"/>
+              </a:tabLst>
+            </a:pPr>
+            <a:r>
+              <a:rPr b="0" lang="es-ES" sz="1800" spc="-1" strike="noStrike">
+                <a:solidFill>
+                  <a:srgbClr val="000000"/>
+                </a:solidFill>
+                <a:latin typeface="Arial"/>
+              </a:rPr>
+              <a:t>La mayoría de CRM dan códigos para incrustar formularios en tu web. Son códigos muy sencillos de usar, generas el formulario y cortas y pegas el código que te dan en tu web, en páginas, widgets, …</a:t>
+            </a:r>
+            <a:endParaRPr b="0" lang="es-ES" sz="1800" spc="-1" strike="noStrike">
+              <a:solidFill>
+                <a:srgbClr val="000000"/>
+              </a:solidFill>
+              <a:latin typeface="Arial"/>
+            </a:endParaRPr>
+          </a:p>
+          <a:p>
+            <a:pPr indent="0">
+              <a:lnSpc>
+                <a:spcPct val="100000"/>
+              </a:lnSpc>
+              <a:spcBef>
+                <a:spcPts val="340"/>
+              </a:spcBef>
+              <a:spcAft>
+                <a:spcPts val="283"/>
+              </a:spcAft>
+              <a:buNone/>
+              <a:tabLst>
+                <a:tab algn="l" pos="0"/>
+              </a:tabLst>
+            </a:pPr>
+            <a:r>
+              <a:rPr b="1" lang="es-ES" sz="1800" spc="-1" strike="noStrike">
+                <a:solidFill>
+                  <a:srgbClr val="000000"/>
+                </a:solidFill>
+                <a:latin typeface="Arial"/>
+              </a:rPr>
+              <a:t>Ventajas:</a:t>
+            </a:r>
+            <a:endParaRPr b="0" lang="es-ES" sz="1800" spc="-1" strike="noStrike">
+              <a:solidFill>
+                <a:srgbClr val="000000"/>
+              </a:solidFill>
+              <a:latin typeface="Arial"/>
+            </a:endParaRPr>
+          </a:p>
+          <a:p>
+            <a:pPr marL="720000" indent="-324000">
+              <a:lnSpc>
+                <a:spcPct val="100000"/>
+              </a:lnSpc>
+              <a:spcBef>
+                <a:spcPts val="340"/>
+              </a:spcBef>
+              <a:spcAft>
+                <a:spcPts val="283"/>
+              </a:spcAft>
+              <a:buClr>
+                <a:srgbClr val="000000"/>
+              </a:buClr>
+              <a:buFont typeface="Wingdings" charset="2"/>
+              <a:buChar char=""/>
+              <a:tabLst>
+                <a:tab algn="l" pos="0"/>
+              </a:tabLst>
+            </a:pPr>
+            <a:r>
+              <a:rPr b="0" lang="es-ES" sz="1800" spc="-1" strike="noStrike">
+                <a:solidFill>
+                  <a:srgbClr val="000000"/>
+                </a:solidFill>
+                <a:latin typeface="Arial"/>
+              </a:rPr>
+              <a:t>Muy fácil de crear e integrar y exigen pocos conocimientos.</a:t>
+            </a:r>
+            <a:endParaRPr b="0" lang="es-ES" sz="1800" spc="-1" strike="noStrike">
+              <a:solidFill>
+                <a:srgbClr val="000000"/>
+              </a:solidFill>
+              <a:latin typeface="Arial"/>
+            </a:endParaRPr>
+          </a:p>
+          <a:p>
+            <a:pPr marL="720000" indent="-324000">
+              <a:lnSpc>
+                <a:spcPct val="100000"/>
+              </a:lnSpc>
+              <a:spcBef>
+                <a:spcPts val="340"/>
+              </a:spcBef>
+              <a:spcAft>
+                <a:spcPts val="283"/>
+              </a:spcAft>
+              <a:buClr>
+                <a:srgbClr val="000000"/>
+              </a:buClr>
+              <a:buFont typeface="Wingdings" charset="2"/>
+              <a:buChar char=""/>
+              <a:tabLst>
+                <a:tab algn="l" pos="0"/>
+              </a:tabLst>
+            </a:pPr>
+            <a:r>
+              <a:rPr b="0" lang="es-ES" sz="1800" spc="-1" strike="noStrike">
+                <a:solidFill>
+                  <a:srgbClr val="000000"/>
+                </a:solidFill>
+                <a:latin typeface="Arial"/>
+              </a:rPr>
+              <a:t>La conexión es directa, no debería haber fallos.</a:t>
+            </a:r>
+            <a:endParaRPr b="0" lang="es-ES" sz="1800" spc="-1" strike="noStrike">
+              <a:solidFill>
+                <a:srgbClr val="000000"/>
+              </a:solidFill>
+              <a:latin typeface="Arial"/>
+            </a:endParaRPr>
+          </a:p>
+          <a:p>
+            <a:pPr marL="720000" indent="-324000">
+              <a:lnSpc>
+                <a:spcPct val="100000"/>
+              </a:lnSpc>
+              <a:spcBef>
+                <a:spcPts val="340"/>
+              </a:spcBef>
+              <a:spcAft>
+                <a:spcPts val="283"/>
+              </a:spcAft>
+              <a:buClr>
+                <a:srgbClr val="000000"/>
+              </a:buClr>
+              <a:buFont typeface="Wingdings" charset="2"/>
+              <a:buChar char=""/>
+              <a:tabLst>
+                <a:tab algn="l" pos="0"/>
+              </a:tabLst>
+            </a:pPr>
+            <a:r>
+              <a:rPr b="0" lang="es-ES" sz="1800" spc="-1" strike="noStrike">
+                <a:solidFill>
+                  <a:srgbClr val="000000"/>
+                </a:solidFill>
+                <a:latin typeface="Arial"/>
+              </a:rPr>
+              <a:t>Ellos se encargan de meter la cookie de rastreo o similares para poder seguir al usuario.</a:t>
+            </a:r>
+            <a:endParaRPr b="0" lang="es-ES" sz="1800" spc="-1" strike="noStrike">
+              <a:solidFill>
+                <a:srgbClr val="000000"/>
+              </a:solidFill>
+              <a:latin typeface="Arial"/>
+            </a:endParaRPr>
+          </a:p>
+          <a:p>
+            <a:pPr indent="0">
+              <a:lnSpc>
+                <a:spcPct val="100000"/>
+              </a:lnSpc>
+              <a:spcBef>
+                <a:spcPts val="340"/>
+              </a:spcBef>
+              <a:spcAft>
+                <a:spcPts val="283"/>
+              </a:spcAft>
+              <a:buNone/>
+              <a:tabLst>
+                <a:tab algn="l" pos="0"/>
+              </a:tabLst>
+            </a:pPr>
+            <a:r>
+              <a:rPr b="1" lang="es-ES" sz="1800" spc="-1" strike="noStrike">
+                <a:solidFill>
+                  <a:srgbClr val="000000"/>
+                </a:solidFill>
+                <a:latin typeface="Arial"/>
+              </a:rPr>
+              <a:t>Desventajas:</a:t>
+            </a:r>
+            <a:endParaRPr b="0" lang="es-ES" sz="1800" spc="-1" strike="noStrike">
+              <a:solidFill>
+                <a:srgbClr val="000000"/>
+              </a:solidFill>
+              <a:latin typeface="Arial"/>
+            </a:endParaRPr>
+          </a:p>
+          <a:p>
+            <a:pPr marL="720000" indent="-324000">
+              <a:lnSpc>
+                <a:spcPct val="100000"/>
+              </a:lnSpc>
+              <a:spcBef>
+                <a:spcPts val="340"/>
+              </a:spcBef>
+              <a:spcAft>
+                <a:spcPts val="283"/>
+              </a:spcAft>
+              <a:buClr>
+                <a:srgbClr val="000000"/>
+              </a:buClr>
+              <a:buFont typeface="Wingdings" charset="2"/>
+              <a:buChar char=""/>
+              <a:tabLst>
+                <a:tab algn="l" pos="0"/>
+              </a:tabLst>
+            </a:pPr>
+            <a:r>
+              <a:rPr b="0" lang="es-ES" sz="1800" spc="-1" strike="noStrike">
+                <a:solidFill>
+                  <a:srgbClr val="000000"/>
+                </a:solidFill>
+                <a:latin typeface="Arial"/>
+              </a:rPr>
+              <a:t>Cuando quieres meter campos especiales que no están en el CRM, te obliga a crear campus personalizados en el CRM para guardar esa información. A la larga creas montones de campos que casi ni se usan.</a:t>
+            </a:r>
+            <a:endParaRPr b="0" lang="es-ES" sz="1800" spc="-1" strike="noStrike">
+              <a:solidFill>
+                <a:srgbClr val="000000"/>
+              </a:solidFill>
+              <a:latin typeface="Arial"/>
+            </a:endParaRPr>
+          </a:p>
+          <a:p>
+            <a:pPr marL="720000" indent="-324000">
+              <a:lnSpc>
+                <a:spcPct val="100000"/>
+              </a:lnSpc>
+              <a:spcBef>
+                <a:spcPts val="340"/>
+              </a:spcBef>
+              <a:spcAft>
+                <a:spcPts val="283"/>
+              </a:spcAft>
+              <a:buClr>
+                <a:srgbClr val="000000"/>
+              </a:buClr>
+              <a:buFont typeface="Wingdings" charset="2"/>
+              <a:buChar char=""/>
+              <a:tabLst>
+                <a:tab algn="l" pos="0"/>
+              </a:tabLst>
+            </a:pPr>
+            <a:r>
+              <a:rPr b="0" lang="es-ES" sz="1800" spc="-1" strike="noStrike">
+                <a:solidFill>
+                  <a:srgbClr val="000000"/>
+                </a:solidFill>
+                <a:latin typeface="Arial"/>
+              </a:rPr>
+              <a:t>No tienen buena integración en el diseño de tu WordPress y suelen quedar un poco pegote.</a:t>
+            </a:r>
+            <a:endParaRPr b="0" lang="es-ES" sz="1800" spc="-1" strike="noStrike">
+              <a:solidFill>
+                <a:srgbClr val="000000"/>
+              </a:solidFill>
+              <a:latin typeface="Arial"/>
+            </a:endParaRPr>
+          </a:p>
+          <a:p>
+            <a:pPr marL="720000" indent="-324000">
+              <a:lnSpc>
+                <a:spcPct val="100000"/>
+              </a:lnSpc>
+              <a:spcBef>
+                <a:spcPts val="340"/>
+              </a:spcBef>
+              <a:spcAft>
+                <a:spcPts val="283"/>
+              </a:spcAft>
+              <a:buClr>
+                <a:srgbClr val="000000"/>
+              </a:buClr>
+              <a:buFont typeface="Wingdings" charset="2"/>
+              <a:buChar char=""/>
+              <a:tabLst>
+                <a:tab algn="l" pos="0"/>
+              </a:tabLst>
+            </a:pPr>
+            <a:r>
+              <a:rPr b="0" lang="es-ES" sz="1800" spc="-1" strike="noStrike">
+                <a:solidFill>
+                  <a:srgbClr val="000000"/>
+                </a:solidFill>
+                <a:latin typeface="Arial"/>
+              </a:rPr>
+              <a:t>No permiten conectar a terceros. Los formularios incrustados se conectan difícilmente con elementos de terceros. Tengo una fundación de una empresa grande que todos los contactos recogidos con los formularios deben registrarse en el CRM que usan ellos (Clientify) y con el de la empresa matriz (Salesforce). Los formularios incrustados de Clientify no permiten hacer una conexión también a Salesforce cumpliendo los requerimientos que Salesforce exige.</a:t>
+            </a:r>
+            <a:endParaRPr b="0" lang="es-ES" sz="1800" spc="-1" strike="noStrike">
+              <a:solidFill>
+                <a:srgbClr val="000000"/>
+              </a:solidFill>
+              <a:latin typeface="Arial"/>
+            </a:endParaRPr>
+          </a:p>
+          <a:p>
+            <a:pPr marL="720000" indent="-324000">
+              <a:lnSpc>
+                <a:spcPct val="100000"/>
+              </a:lnSpc>
+              <a:spcBef>
+                <a:spcPts val="340"/>
+              </a:spcBef>
+              <a:spcAft>
+                <a:spcPts val="283"/>
+              </a:spcAft>
+              <a:buClr>
+                <a:srgbClr val="000000"/>
+              </a:buClr>
+              <a:buFont typeface="Wingdings" charset="2"/>
+              <a:buChar char=""/>
+              <a:tabLst>
+                <a:tab algn="l" pos="0"/>
+              </a:tabLst>
+            </a:pPr>
+            <a:r>
+              <a:rPr b="0" lang="es-ES" sz="1800" spc="-1" strike="noStrike">
+                <a:solidFill>
+                  <a:srgbClr val="000000"/>
+                </a:solidFill>
+                <a:latin typeface="Arial"/>
+              </a:rPr>
+              <a:t>Si cae el CRM caen los formularios de tu web. No suelen fallar, pero puede pasar.</a:t>
+            </a:r>
+            <a:endParaRPr b="0" lang="es-ES" sz="1800" spc="-1" strike="noStrike">
+              <a:solidFill>
+                <a:srgbClr val="000000"/>
+              </a:solidFill>
+              <a:latin typeface="Arial"/>
+            </a:endParaRPr>
+          </a:p>
+          <a:p>
+            <a:pPr indent="0">
+              <a:lnSpc>
+                <a:spcPct val="100000"/>
+              </a:lnSpc>
+              <a:spcBef>
+                <a:spcPts val="1191"/>
+              </a:spcBef>
+              <a:spcAft>
+                <a:spcPts val="992"/>
+              </a:spcAft>
+              <a:buNone/>
+              <a:tabLst>
+                <a:tab algn="l" pos="0"/>
+              </a:tabLst>
+            </a:pPr>
+            <a:endParaRPr b="0" lang="es-ES" sz="1800" spc="-1" strike="noStrike">
+              <a:solidFill>
+                <a:srgbClr val="000000"/>
+              </a:solidFill>
+              <a:latin typeface="Arial"/>
+            </a:endParaRPr>
+          </a:p>
+        </p:txBody>
+      </p:sp>
+      <p:sp>
+        <p:nvSpPr>
+          <p:cNvPr id="77" name="PlaceHolder 3"/>
+          <p:cNvSpPr>
+            <a:spLocks noGrp="1"/>
+          </p:cNvSpPr>
+          <p:nvPr>
+            <p:ph type="title"/>
+          </p:nvPr>
+        </p:nvSpPr>
+        <p:spPr>
+          <a:xfrm>
+            <a:off x="2329200" y="294480"/>
             <a:ext cx="6490440" cy="520920"/>
           </a:xfrm>
           <a:prstGeom prst="rect">
@@ -10703,7 +10548,7 @@
             <a:r>
               <a:rPr b="1" lang="es-ES" sz="1800" spc="-1" strike="noStrike">
                 <a:solidFill>
-                  <a:srgbClr val="174575"/>
+                  <a:srgbClr val="000000"/>
                 </a:solidFill>
                 <a:latin typeface="Arial"/>
               </a:rPr>
@@ -10712,216 +10557,11 @@
             <a:r>
               <a:rPr b="0" lang="es-ES" sz="1800" spc="-1" strike="noStrike">
                 <a:solidFill>
-                  <a:srgbClr val="174575"/>
+                  <a:srgbClr val="000000"/>
                 </a:solidFill>
                 <a:latin typeface="Arial"/>
               </a:rPr>
               <a:t>[̲̅$̲̅(̲̅ιοο̲̅)̲̅$̲̅]</a:t>
-            </a:r>
-            <a:endParaRPr b="0" lang="es-ES" sz="1800" spc="-1" strike="noStrike">
-              <a:solidFill>
-                <a:srgbClr val="000000"/>
-              </a:solidFill>
-              <a:latin typeface="Arial"/>
-            </a:endParaRPr>
-          </a:p>
-        </p:txBody>
-      </p:sp>
-      <p:sp>
-        <p:nvSpPr>
-          <p:cNvPr id="76" name="PlaceHolder 2"/>
-          <p:cNvSpPr>
-            <a:spLocks noGrp="1"/>
-          </p:cNvSpPr>
-          <p:nvPr>
-            <p:ph/>
-          </p:nvPr>
-        </p:nvSpPr>
-        <p:spPr>
-          <a:xfrm>
-            <a:off x="311760" y="1461600"/>
-            <a:ext cx="5087520" cy="3116520"/>
-          </a:xfrm>
-          <a:prstGeom prst="rect">
-            <a:avLst/>
-          </a:prstGeom>
-          <a:noFill/>
-          <a:ln w="0">
-            <a:noFill/>
-          </a:ln>
-        </p:spPr>
-        <p:txBody>
-          <a:bodyPr lIns="91440" rIns="91440" tIns="91440" bIns="91440" anchor="t">
-            <a:normAutofit/>
-          </a:bodyPr>
-          <a:p>
-            <a:pPr indent="0">
-              <a:lnSpc>
-                <a:spcPct val="100000"/>
-              </a:lnSpc>
-              <a:spcBef>
-                <a:spcPts val="1191"/>
-              </a:spcBef>
-              <a:spcAft>
-                <a:spcPts val="992"/>
-              </a:spcAft>
-              <a:buNone/>
-              <a:tabLst>
-                <a:tab algn="l" pos="0"/>
-              </a:tabLst>
-            </a:pPr>
-            <a:r>
-              <a:rPr b="0" lang="es-ES" sz="1800" spc="-1" strike="noStrike">
-                <a:solidFill>
-                  <a:srgbClr val="000000"/>
-                </a:solidFill>
-                <a:latin typeface="Arial"/>
-              </a:rPr>
-              <a:t>La forma más común de conexión entre WordPress y Un CRM es mediante formularios. Está conexión se puede hacer mediante diferentes formas.</a:t>
-            </a:r>
-            <a:endParaRPr b="0" lang="es-ES" sz="1800" spc="-1" strike="noStrike">
-              <a:solidFill>
-                <a:srgbClr val="000000"/>
-              </a:solidFill>
-              <a:latin typeface="Arial"/>
-            </a:endParaRPr>
-          </a:p>
-          <a:p>
-            <a:pPr marL="720000" indent="-324000">
-              <a:lnSpc>
-                <a:spcPct val="100000"/>
-              </a:lnSpc>
-              <a:spcBef>
-                <a:spcPts val="340"/>
-              </a:spcBef>
-              <a:spcAft>
-                <a:spcPts val="142"/>
-              </a:spcAft>
-              <a:buClr>
-                <a:srgbClr val="000000"/>
-              </a:buClr>
-              <a:buFont typeface="Symbol" charset="2"/>
-              <a:buChar char=""/>
-              <a:tabLst>
-                <a:tab algn="l" pos="0"/>
-              </a:tabLst>
-            </a:pPr>
-            <a:r>
-              <a:rPr b="0" lang="es-ES" sz="1800" spc="-1" strike="noStrike">
-                <a:solidFill>
-                  <a:srgbClr val="000000"/>
-                </a:solidFill>
-                <a:latin typeface="Arial"/>
-              </a:rPr>
-              <a:t>Incrustados</a:t>
-            </a:r>
-            <a:endParaRPr b="0" lang="es-ES" sz="1800" spc="-1" strike="noStrike">
-              <a:solidFill>
-                <a:srgbClr val="000000"/>
-              </a:solidFill>
-              <a:latin typeface="Arial"/>
-            </a:endParaRPr>
-          </a:p>
-          <a:p>
-            <a:pPr marL="720000" indent="-324000">
-              <a:lnSpc>
-                <a:spcPct val="100000"/>
-              </a:lnSpc>
-              <a:spcBef>
-                <a:spcPts val="340"/>
-              </a:spcBef>
-              <a:spcAft>
-                <a:spcPts val="142"/>
-              </a:spcAft>
-              <a:buClr>
-                <a:srgbClr val="000000"/>
-              </a:buClr>
-              <a:buFont typeface="Symbol" charset="2"/>
-              <a:buChar char=""/>
-              <a:tabLst>
-                <a:tab algn="l" pos="0"/>
-              </a:tabLst>
-            </a:pPr>
-            <a:r>
-              <a:rPr b="0" lang="es-ES" sz="1800" spc="-1" strike="noStrike">
-                <a:solidFill>
-                  <a:srgbClr val="000000"/>
-                </a:solidFill>
-                <a:latin typeface="Arial"/>
-              </a:rPr>
-              <a:t>Conectados con un plugin</a:t>
-            </a:r>
-            <a:endParaRPr b="0" lang="es-ES" sz="1800" spc="-1" strike="noStrike">
-              <a:solidFill>
-                <a:srgbClr val="000000"/>
-              </a:solidFill>
-              <a:latin typeface="Arial"/>
-            </a:endParaRPr>
-          </a:p>
-          <a:p>
-            <a:pPr marL="720000" indent="-324000">
-              <a:lnSpc>
-                <a:spcPct val="100000"/>
-              </a:lnSpc>
-              <a:spcBef>
-                <a:spcPts val="340"/>
-              </a:spcBef>
-              <a:spcAft>
-                <a:spcPts val="142"/>
-              </a:spcAft>
-              <a:buClr>
-                <a:srgbClr val="000000"/>
-              </a:buClr>
-              <a:buFont typeface="Symbol" charset="2"/>
-              <a:buChar char=""/>
-              <a:tabLst>
-                <a:tab algn="l" pos="0"/>
-              </a:tabLst>
-            </a:pPr>
-            <a:r>
-              <a:rPr b="0" lang="es-ES" sz="1800" spc="-1" strike="noStrike">
-                <a:solidFill>
-                  <a:srgbClr val="000000"/>
-                </a:solidFill>
-                <a:latin typeface="Arial"/>
-              </a:rPr>
-              <a:t>Conectados con un desarrollo propio</a:t>
-            </a:r>
-            <a:endParaRPr b="0" lang="es-ES" sz="1800" spc="-1" strike="noStrike">
-              <a:solidFill>
-                <a:srgbClr val="000000"/>
-              </a:solidFill>
-              <a:latin typeface="Arial"/>
-            </a:endParaRPr>
-          </a:p>
-          <a:p>
-            <a:pPr marL="720000" indent="-324000">
-              <a:lnSpc>
-                <a:spcPct val="100000"/>
-              </a:lnSpc>
-              <a:spcBef>
-                <a:spcPts val="340"/>
-              </a:spcBef>
-              <a:spcAft>
-                <a:spcPts val="142"/>
-              </a:spcAft>
-              <a:buClr>
-                <a:srgbClr val="000000"/>
-              </a:buClr>
-              <a:buFont typeface="Symbol" charset="2"/>
-              <a:buChar char=""/>
-              <a:tabLst>
-                <a:tab algn="l" pos="0"/>
-              </a:tabLst>
-            </a:pPr>
-            <a:r>
-              <a:rPr b="0" lang="es-ES" sz="1800" spc="-1" strike="noStrike">
-                <a:solidFill>
-                  <a:srgbClr val="000000"/>
-                </a:solidFill>
-                <a:latin typeface="Arial"/>
-              </a:rPr>
-              <a:t>Mixtos</a:t>
             </a:r>
             <a:endParaRPr b="0" lang="es-ES" sz="1800" spc="-1" strike="noStrike">
               <a:solidFill>

</xml_diff>